<commit_message>
towards reveiw for lecture 7
</commit_message>
<xml_diff>
--- a/classes/prog2016/Lab07Review.pptx
+++ b/classes/prog2016/Lab07Review.pptx
@@ -11,6 +11,7 @@
     <p:sldId id="258" r:id="rId5"/>
     <p:sldId id="260" r:id="rId6"/>
     <p:sldId id="261" r:id="rId7"/>
+    <p:sldId id="262" r:id="rId8"/>
   </p:sldIdLst>
   <p:sldSz cx="12192000" cy="6858000"/>
   <p:notesSz cx="6858000" cy="9144000"/>
@@ -109,6 +110,11 @@
       </a:defRPr>
     </a:lvl9pPr>
   </p:defaultTextStyle>
+  <p:extLst>
+    <p:ext uri="{EFAFB233-063F-42B5-8137-9DF3F51BA10A}">
+      <p15:sldGuideLst xmlns:p15="http://schemas.microsoft.com/office/powerpoint/2012/main"/>
+    </p:ext>
+  </p:extLst>
 </p:presentation>
 </file>
 
@@ -157,7 +163,6 @@
               <a:rPr lang="en-US"/>
               <a:t>Click to edit Master title style</a:t>
             </a:r>
-            <a:endParaRPr lang="en-US"/>
           </a:p>
         </p:txBody>
       </p:sp>
@@ -222,7 +227,6 @@
               <a:rPr lang="en-US"/>
               <a:t>Click to edit Master subtitle style</a:t>
             </a:r>
-            <a:endParaRPr lang="en-US"/>
           </a:p>
         </p:txBody>
       </p:sp>
@@ -340,7 +344,6 @@
               <a:rPr lang="en-US"/>
               <a:t>Click to edit Master title style</a:t>
             </a:r>
-            <a:endParaRPr lang="en-US"/>
           </a:p>
         </p:txBody>
       </p:sp>
@@ -392,7 +395,6 @@
               <a:rPr lang="en-US"/>
               <a:t>Fifth level</a:t>
             </a:r>
-            <a:endParaRPr lang="en-US"/>
           </a:p>
         </p:txBody>
       </p:sp>
@@ -515,7 +517,6 @@
               <a:rPr lang="en-US"/>
               <a:t>Click to edit Master title style</a:t>
             </a:r>
-            <a:endParaRPr lang="en-US"/>
           </a:p>
         </p:txBody>
       </p:sp>
@@ -572,7 +573,6 @@
               <a:rPr lang="en-US"/>
               <a:t>Fifth level</a:t>
             </a:r>
-            <a:endParaRPr lang="en-US"/>
           </a:p>
         </p:txBody>
       </p:sp>
@@ -690,7 +690,6 @@
               <a:rPr lang="en-US"/>
               <a:t>Click to edit Master title style</a:t>
             </a:r>
-            <a:endParaRPr lang="en-US"/>
           </a:p>
         </p:txBody>
       </p:sp>
@@ -742,7 +741,6 @@
               <a:rPr lang="en-US"/>
               <a:t>Fifth level</a:t>
             </a:r>
-            <a:endParaRPr lang="en-US"/>
           </a:p>
         </p:txBody>
       </p:sp>
@@ -869,7 +867,6 @@
               <a:rPr lang="en-US"/>
               <a:t>Click to edit Master title style</a:t>
             </a:r>
-            <a:endParaRPr lang="en-US"/>
           </a:p>
         </p:txBody>
       </p:sp>
@@ -1106,7 +1103,6 @@
               <a:rPr lang="en-US"/>
               <a:t>Click to edit Master title style</a:t>
             </a:r>
-            <a:endParaRPr lang="en-US"/>
           </a:p>
         </p:txBody>
       </p:sp>
@@ -1163,7 +1159,6 @@
               <a:rPr lang="en-US"/>
               <a:t>Fifth level</a:t>
             </a:r>
-            <a:endParaRPr lang="en-US"/>
           </a:p>
         </p:txBody>
       </p:sp>
@@ -1220,7 +1215,6 @@
               <a:rPr lang="en-US"/>
               <a:t>Fifth level</a:t>
             </a:r>
-            <a:endParaRPr lang="en-US"/>
           </a:p>
         </p:txBody>
       </p:sp>
@@ -1343,7 +1337,6 @@
               <a:rPr lang="en-US"/>
               <a:t>Click to edit Master title style</a:t>
             </a:r>
-            <a:endParaRPr lang="en-US"/>
           </a:p>
         </p:txBody>
       </p:sp>
@@ -1465,7 +1458,6 @@
               <a:rPr lang="en-US"/>
               <a:t>Fifth level</a:t>
             </a:r>
-            <a:endParaRPr lang="en-US"/>
           </a:p>
         </p:txBody>
       </p:sp>
@@ -1587,7 +1579,6 @@
               <a:rPr lang="en-US"/>
               <a:t>Fifth level</a:t>
             </a:r>
-            <a:endParaRPr lang="en-US"/>
           </a:p>
         </p:txBody>
       </p:sp>
@@ -1705,7 +1696,6 @@
               <a:rPr lang="en-US"/>
               <a:t>Click to edit Master title style</a:t>
             </a:r>
-            <a:endParaRPr lang="en-US"/>
           </a:p>
         </p:txBody>
       </p:sp>
@@ -1927,7 +1917,6 @@
               <a:rPr lang="en-US"/>
               <a:t>Click to edit Master title style</a:t>
             </a:r>
-            <a:endParaRPr lang="en-US"/>
           </a:p>
         </p:txBody>
       </p:sp>
@@ -2012,7 +2001,6 @@
               <a:rPr lang="en-US"/>
               <a:t>Fifth level</a:t>
             </a:r>
-            <a:endParaRPr lang="en-US"/>
           </a:p>
         </p:txBody>
       </p:sp>
@@ -2204,7 +2192,6 @@
               <a:rPr lang="en-US"/>
               <a:t>Click to edit Master title style</a:t>
             </a:r>
-            <a:endParaRPr lang="en-US"/>
           </a:p>
         </p:txBody>
       </p:sp>
@@ -2463,7 +2450,6 @@
               <a:rPr lang="en-US"/>
               <a:t>Click to edit Master title style</a:t>
             </a:r>
-            <a:endParaRPr lang="en-US"/>
           </a:p>
         </p:txBody>
       </p:sp>
@@ -2525,7 +2511,6 @@
               <a:rPr lang="en-US"/>
               <a:t>Fifth level</a:t>
             </a:r>
-            <a:endParaRPr lang="en-US"/>
           </a:p>
         </p:txBody>
       </p:sp>
@@ -3585,7 +3570,7 @@
         <p:spPr>
           <a:xfrm>
             <a:off x="603115" y="3560323"/>
-            <a:ext cx="9542099" cy="1477328"/>
+            <a:ext cx="9619044" cy="2031325"/>
           </a:xfrm>
           <a:prstGeom prst="rect">
             <a:avLst/>
@@ -3662,6 +3647,21 @@
                 <a:cs typeface="Arial" panose="020B0604020202020204" pitchFamily="34" charset="0"/>
               </a:rPr>
               <a:t> as an alternative (will give scroll bars…)</a:t>
+            </a:r>
+          </a:p>
+          <a:p>
+            <a:endParaRPr lang="en-US" dirty="0">
+              <a:latin typeface="Arial" panose="020B0604020202020204" pitchFamily="34" charset="0"/>
+              <a:cs typeface="Arial" panose="020B0604020202020204" pitchFamily="34" charset="0"/>
+            </a:endParaRPr>
+          </a:p>
+          <a:p>
+            <a:r>
+              <a:rPr lang="en-US" dirty="0">
+                <a:latin typeface="Arial" panose="020B0604020202020204" pitchFamily="34" charset="0"/>
+                <a:cs typeface="Arial" panose="020B0604020202020204" pitchFamily="34" charset="0"/>
+              </a:rPr>
+              <a:t>Also, the dialog can take a long time to render, effectively making the application look frozen</a:t>
             </a:r>
           </a:p>
         </p:txBody>
@@ -4002,10 +4002,186 @@
           <a:chExt cx="0" cy="0"/>
         </a:xfrm>
       </p:grpSpPr>
+      <p:sp>
+        <p:nvSpPr>
+          <p:cNvPr id="2" name="TextBox 1"/>
+          <p:cNvSpPr txBox="1"/>
+          <p:nvPr/>
+        </p:nvSpPr>
+        <p:spPr>
+          <a:xfrm>
+            <a:off x="475014" y="130630"/>
+            <a:ext cx="7019870" cy="369332"/>
+          </a:xfrm>
+          <a:prstGeom prst="rect">
+            <a:avLst/>
+          </a:prstGeom>
+          <a:noFill/>
+        </p:spPr>
+        <p:txBody>
+          <a:bodyPr wrap="none" rtlCol="0">
+            <a:spAutoFit/>
+          </a:bodyPr>
+          <a:lstStyle/>
+          <a:p>
+            <a:r>
+              <a:rPr lang="en-US" dirty="0">
+                <a:latin typeface="Arial" panose="020B0604020202020204" pitchFamily="34" charset="0"/>
+                <a:cs typeface="Arial" panose="020B0604020202020204" pitchFamily="34" charset="0"/>
+              </a:rPr>
+              <a:t>I made a version that (I think) may address some of these issues…</a:t>
+            </a:r>
+          </a:p>
+        </p:txBody>
+      </p:sp>
+      <p:sp>
+        <p:nvSpPr>
+          <p:cNvPr id="3" name="Rectangle 2"/>
+          <p:cNvSpPr/>
+          <p:nvPr/>
+        </p:nvSpPr>
+        <p:spPr>
+          <a:xfrm>
+            <a:off x="475014" y="6300298"/>
+            <a:ext cx="11297392" cy="369332"/>
+          </a:xfrm>
+          <a:prstGeom prst="rect">
+            <a:avLst/>
+          </a:prstGeom>
+        </p:spPr>
+        <p:txBody>
+          <a:bodyPr wrap="square">
+            <a:spAutoFit/>
+          </a:bodyPr>
+          <a:lstStyle/>
+          <a:p>
+            <a:r>
+              <a:rPr lang="en-US" dirty="0"/>
+              <a:t>https://github.com/afodor/metagenomicsTools/blob/master/src/classExamples/gui/PrimeNumGen.java</a:t>
+            </a:r>
+          </a:p>
+        </p:txBody>
+      </p:sp>
+      <p:pic>
+        <p:nvPicPr>
+          <p:cNvPr id="4" name="Picture 3"/>
+          <p:cNvPicPr>
+            <a:picLocks noChangeAspect="1"/>
+          </p:cNvPicPr>
+          <p:nvPr/>
+        </p:nvPicPr>
+        <p:blipFill>
+          <a:blip r:embed="rId2"/>
+          <a:stretch>
+            <a:fillRect/>
+          </a:stretch>
+        </p:blipFill>
+        <p:spPr>
+          <a:xfrm>
+            <a:off x="619744" y="881494"/>
+            <a:ext cx="7134843" cy="4193763"/>
+          </a:xfrm>
+          <a:prstGeom prst="rect">
+            <a:avLst/>
+          </a:prstGeom>
+        </p:spPr>
+      </p:pic>
+      <p:cxnSp>
+        <p:nvCxnSpPr>
+          <p:cNvPr id="8" name="Straight Arrow Connector 7"/>
+          <p:cNvCxnSpPr/>
+          <p:nvPr/>
+        </p:nvCxnSpPr>
+        <p:spPr>
+          <a:xfrm flipH="1" flipV="1">
+            <a:off x="5118265" y="2802577"/>
+            <a:ext cx="807522" cy="178129"/>
+          </a:xfrm>
+          <a:prstGeom prst="straightConnector1">
+            <a:avLst/>
+          </a:prstGeom>
+          <a:ln>
+            <a:tailEnd type="triangle"/>
+          </a:ln>
+        </p:spPr>
+        <p:style>
+          <a:lnRef idx="1">
+            <a:schemeClr val="accent1"/>
+          </a:lnRef>
+          <a:fillRef idx="0">
+            <a:schemeClr val="accent1"/>
+          </a:fillRef>
+          <a:effectRef idx="0">
+            <a:schemeClr val="accent1"/>
+          </a:effectRef>
+          <a:fontRef idx="minor">
+            <a:schemeClr val="tx1"/>
+          </a:fontRef>
+        </p:style>
+      </p:cxnSp>
+      <p:sp>
+        <p:nvSpPr>
+          <p:cNvPr id="9" name="TextBox 8"/>
+          <p:cNvSpPr txBox="1"/>
+          <p:nvPr/>
+        </p:nvSpPr>
+        <p:spPr>
+          <a:xfrm>
+            <a:off x="6068291" y="2838203"/>
+            <a:ext cx="1881734" cy="369332"/>
+          </a:xfrm>
+          <a:prstGeom prst="rect">
+            <a:avLst/>
+          </a:prstGeom>
+          <a:noFill/>
+        </p:spPr>
+        <p:txBody>
+          <a:bodyPr wrap="none" rtlCol="0">
+            <a:spAutoFit/>
+          </a:bodyPr>
+          <a:lstStyle/>
+          <a:p>
+            <a:r>
+              <a:rPr lang="en-US" dirty="0"/>
+              <a:t>Volatile cancel tag</a:t>
+            </a:r>
+          </a:p>
+        </p:txBody>
+      </p:sp>
     </p:spTree>
     <p:extLst>
       <p:ext uri="{BB962C8B-B14F-4D97-AF65-F5344CB8AC3E}">
         <p14:creationId xmlns:p14="http://schemas.microsoft.com/office/powerpoint/2010/main" val="2833409814"/>
+      </p:ext>
+    </p:extLst>
+  </p:cSld>
+  <p:clrMapOvr>
+    <a:masterClrMapping/>
+  </p:clrMapOvr>
+</p:sld>
+</file>
+
+<file path=ppt/slides/slide7.xml><?xml version="1.0" encoding="utf-8"?>
+<p:sld xmlns:a="http://schemas.openxmlformats.org/drawingml/2006/main" xmlns:r="http://schemas.openxmlformats.org/officeDocument/2006/relationships" xmlns:p="http://schemas.openxmlformats.org/presentationml/2006/main">
+  <p:cSld>
+    <p:spTree>
+      <p:nvGrpSpPr>
+        <p:cNvPr id="1" name=""/>
+        <p:cNvGrpSpPr/>
+        <p:nvPr/>
+      </p:nvGrpSpPr>
+      <p:grpSpPr>
+        <a:xfrm>
+          <a:off x="0" y="0"/>
+          <a:ext cx="0" cy="0"/>
+          <a:chOff x="0" y="0"/>
+          <a:chExt cx="0" cy="0"/>
+        </a:xfrm>
+      </p:grpSpPr>
+    </p:spTree>
+    <p:extLst>
+      <p:ext uri="{BB962C8B-B14F-4D97-AF65-F5344CB8AC3E}">
+        <p14:creationId xmlns:p14="http://schemas.microsoft.com/office/powerpoint/2010/main" val="3936695301"/>
       </p:ext>
     </p:extLst>
   </p:cSld>

</xml_diff>

<commit_message>
towards lab 7 review... (still need screenshots)
</commit_message>
<xml_diff>
--- a/classes/prog2016/Lab07Review.pptx
+++ b/classes/prog2016/Lab07Review.pptx
@@ -5,13 +5,20 @@
     <p:sldMasterId id="2147483648" r:id="rId1"/>
   </p:sldMasterIdLst>
   <p:sldIdLst>
-    <p:sldId id="256" r:id="rId2"/>
-    <p:sldId id="257" r:id="rId3"/>
-    <p:sldId id="259" r:id="rId4"/>
-    <p:sldId id="258" r:id="rId5"/>
-    <p:sldId id="260" r:id="rId6"/>
-    <p:sldId id="261" r:id="rId7"/>
-    <p:sldId id="262" r:id="rId8"/>
+    <p:sldId id="269" r:id="rId2"/>
+    <p:sldId id="256" r:id="rId3"/>
+    <p:sldId id="257" r:id="rId4"/>
+    <p:sldId id="259" r:id="rId5"/>
+    <p:sldId id="258" r:id="rId6"/>
+    <p:sldId id="260" r:id="rId7"/>
+    <p:sldId id="263" r:id="rId8"/>
+    <p:sldId id="261" r:id="rId9"/>
+    <p:sldId id="264" r:id="rId10"/>
+    <p:sldId id="262" r:id="rId11"/>
+    <p:sldId id="268" r:id="rId12"/>
+    <p:sldId id="265" r:id="rId13"/>
+    <p:sldId id="266" r:id="rId14"/>
+    <p:sldId id="267" r:id="rId15"/>
   </p:sldIdLst>
   <p:sldSz cx="12192000" cy="6858000"/>
   <p:notesSz cx="6858000" cy="9144000"/>
@@ -247,7 +254,7 @@
           <a:p>
             <a:fld id="{6E4A32A2-E3BE-4D8B-92E6-2D2DA0DE8B25}" type="datetimeFigureOut">
               <a:rPr lang="en-US" smtClean="0"/>
-              <a:t>11/11/2016</a:t>
+              <a:t>11/12/2016</a:t>
             </a:fld>
             <a:endParaRPr lang="en-US"/>
           </a:p>
@@ -415,7 +422,7 @@
           <a:p>
             <a:fld id="{6E4A32A2-E3BE-4D8B-92E6-2D2DA0DE8B25}" type="datetimeFigureOut">
               <a:rPr lang="en-US" smtClean="0"/>
-              <a:t>11/11/2016</a:t>
+              <a:t>11/12/2016</a:t>
             </a:fld>
             <a:endParaRPr lang="en-US"/>
           </a:p>
@@ -593,7 +600,7 @@
           <a:p>
             <a:fld id="{6E4A32A2-E3BE-4D8B-92E6-2D2DA0DE8B25}" type="datetimeFigureOut">
               <a:rPr lang="en-US" smtClean="0"/>
-              <a:t>11/11/2016</a:t>
+              <a:t>11/12/2016</a:t>
             </a:fld>
             <a:endParaRPr lang="en-US"/>
           </a:p>
@@ -761,7 +768,7 @@
           <a:p>
             <a:fld id="{6E4A32A2-E3BE-4D8B-92E6-2D2DA0DE8B25}" type="datetimeFigureOut">
               <a:rPr lang="en-US" smtClean="0"/>
-              <a:t>11/11/2016</a:t>
+              <a:t>11/12/2016</a:t>
             </a:fld>
             <a:endParaRPr lang="en-US"/>
           </a:p>
@@ -1006,7 +1013,7 @@
           <a:p>
             <a:fld id="{6E4A32A2-E3BE-4D8B-92E6-2D2DA0DE8B25}" type="datetimeFigureOut">
               <a:rPr lang="en-US" smtClean="0"/>
-              <a:t>11/11/2016</a:t>
+              <a:t>11/12/2016</a:t>
             </a:fld>
             <a:endParaRPr lang="en-US"/>
           </a:p>
@@ -1235,7 +1242,7 @@
           <a:p>
             <a:fld id="{6E4A32A2-E3BE-4D8B-92E6-2D2DA0DE8B25}" type="datetimeFigureOut">
               <a:rPr lang="en-US" smtClean="0"/>
-              <a:t>11/11/2016</a:t>
+              <a:t>11/12/2016</a:t>
             </a:fld>
             <a:endParaRPr lang="en-US"/>
           </a:p>
@@ -1599,7 +1606,7 @@
           <a:p>
             <a:fld id="{6E4A32A2-E3BE-4D8B-92E6-2D2DA0DE8B25}" type="datetimeFigureOut">
               <a:rPr lang="en-US" smtClean="0"/>
-              <a:t>11/11/2016</a:t>
+              <a:t>11/12/2016</a:t>
             </a:fld>
             <a:endParaRPr lang="en-US"/>
           </a:p>
@@ -1716,7 +1723,7 @@
           <a:p>
             <a:fld id="{6E4A32A2-E3BE-4D8B-92E6-2D2DA0DE8B25}" type="datetimeFigureOut">
               <a:rPr lang="en-US" smtClean="0"/>
-              <a:t>11/11/2016</a:t>
+              <a:t>11/12/2016</a:t>
             </a:fld>
             <a:endParaRPr lang="en-US"/>
           </a:p>
@@ -1811,7 +1818,7 @@
           <a:p>
             <a:fld id="{6E4A32A2-E3BE-4D8B-92E6-2D2DA0DE8B25}" type="datetimeFigureOut">
               <a:rPr lang="en-US" smtClean="0"/>
-              <a:t>11/11/2016</a:t>
+              <a:t>11/12/2016</a:t>
             </a:fld>
             <a:endParaRPr lang="en-US"/>
           </a:p>
@@ -2086,7 +2093,7 @@
           <a:p>
             <a:fld id="{6E4A32A2-E3BE-4D8B-92E6-2D2DA0DE8B25}" type="datetimeFigureOut">
               <a:rPr lang="en-US" smtClean="0"/>
-              <a:t>11/11/2016</a:t>
+              <a:t>11/12/2016</a:t>
             </a:fld>
             <a:endParaRPr lang="en-US"/>
           </a:p>
@@ -2338,7 +2345,7 @@
           <a:p>
             <a:fld id="{6E4A32A2-E3BE-4D8B-92E6-2D2DA0DE8B25}" type="datetimeFigureOut">
               <a:rPr lang="en-US" smtClean="0"/>
-              <a:t>11/11/2016</a:t>
+              <a:t>11/12/2016</a:t>
             </a:fld>
             <a:endParaRPr lang="en-US"/>
           </a:p>
@@ -2549,7 +2556,7 @@
           <a:p>
             <a:fld id="{6E4A32A2-E3BE-4D8B-92E6-2D2DA0DE8B25}" type="datetimeFigureOut">
               <a:rPr lang="en-US" smtClean="0"/>
-              <a:t>11/11/2016</a:t>
+              <a:t>11/12/2016</a:t>
             </a:fld>
             <a:endParaRPr lang="en-US"/>
           </a:p>
@@ -2954,6 +2961,65 @@
           <a:chExt cx="0" cy="0"/>
         </a:xfrm>
       </p:grpSpPr>
+      <p:sp>
+        <p:nvSpPr>
+          <p:cNvPr id="4" name="TextBox 3"/>
+          <p:cNvSpPr txBox="1"/>
+          <p:nvPr/>
+        </p:nvSpPr>
+        <p:spPr>
+          <a:xfrm>
+            <a:off x="1114816" y="469726"/>
+            <a:ext cx="7424853" cy="369332"/>
+          </a:xfrm>
+          <a:prstGeom prst="rect">
+            <a:avLst/>
+          </a:prstGeom>
+          <a:noFill/>
+        </p:spPr>
+        <p:txBody>
+          <a:bodyPr wrap="none" rtlCol="0">
+            <a:spAutoFit/>
+          </a:bodyPr>
+          <a:lstStyle/>
+          <a:p>
+            <a:r>
+              <a:rPr lang="en-US" dirty="0"/>
+              <a:t>Reviewing multi-threaded designs from Assignment #7 (multi-threaded GUI…)</a:t>
+            </a:r>
+          </a:p>
+        </p:txBody>
+      </p:sp>
+    </p:spTree>
+    <p:extLst>
+      <p:ext uri="{BB962C8B-B14F-4D97-AF65-F5344CB8AC3E}">
+        <p14:creationId xmlns:p14="http://schemas.microsoft.com/office/powerpoint/2010/main" val="1739917678"/>
+      </p:ext>
+    </p:extLst>
+  </p:cSld>
+  <p:clrMapOvr>
+    <a:masterClrMapping/>
+  </p:clrMapOvr>
+</p:sld>
+</file>
+
+<file path=ppt/slides/slide10.xml><?xml version="1.0" encoding="utf-8"?>
+<p:sld xmlns:a="http://schemas.openxmlformats.org/drawingml/2006/main" xmlns:r="http://schemas.openxmlformats.org/officeDocument/2006/relationships" xmlns:p="http://schemas.openxmlformats.org/presentationml/2006/main">
+  <p:cSld>
+    <p:spTree>
+      <p:nvGrpSpPr>
+        <p:cNvPr id="1" name=""/>
+        <p:cNvGrpSpPr/>
+        <p:nvPr/>
+      </p:nvGrpSpPr>
+      <p:grpSpPr>
+        <a:xfrm>
+          <a:off x="0" y="0"/>
+          <a:ext cx="0" cy="0"/>
+          <a:chOff x="0" y="0"/>
+          <a:chExt cx="0" cy="0"/>
+        </a:xfrm>
+      </p:grpSpPr>
       <p:pic>
         <p:nvPicPr>
           <p:cNvPr id="5" name="Picture 4"/>
@@ -2970,8 +3036,8 @@
         </p:blipFill>
         <p:spPr>
           <a:xfrm>
-            <a:off x="1791355" y="1080110"/>
-            <a:ext cx="3958092" cy="2071260"/>
+            <a:off x="4014591" y="794071"/>
+            <a:ext cx="7594144" cy="5293578"/>
           </a:xfrm>
           <a:prstGeom prst="rect">
             <a:avLst/>
@@ -2980,23 +3046,18 @@
       </p:pic>
       <p:cxnSp>
         <p:nvCxnSpPr>
-          <p:cNvPr id="9" name="Straight Arrow Connector 8"/>
-          <p:cNvCxnSpPr>
-            <a:cxnSpLocks/>
-          </p:cNvCxnSpPr>
+          <p:cNvPr id="7" name="Straight Connector 6"/>
+          <p:cNvCxnSpPr/>
           <p:nvPr/>
         </p:nvCxnSpPr>
         <p:spPr>
-          <a:xfrm flipV="1">
-            <a:off x="951980" y="1771750"/>
-            <a:ext cx="1091405" cy="144734"/>
-          </a:xfrm>
-          <a:prstGeom prst="straightConnector1">
-            <a:avLst/>
-          </a:prstGeom>
-          <a:ln>
-            <a:tailEnd type="triangle"/>
-          </a:ln>
+          <a:xfrm>
+            <a:off x="3789123" y="795403"/>
+            <a:ext cx="0" cy="5862181"/>
+          </a:xfrm>
+          <a:prstGeom prst="line">
+            <a:avLst/>
+          </a:prstGeom>
         </p:spPr>
         <p:style>
           <a:lnRef idx="1">
@@ -3015,7 +3076,7 @@
       </p:cxnSp>
       <p:pic>
         <p:nvPicPr>
-          <p:cNvPr id="12" name="Picture 11"/>
+          <p:cNvPr id="8" name="Picture 7"/>
           <p:cNvPicPr>
             <a:picLocks noChangeAspect="1"/>
           </p:cNvPicPr>
@@ -3029,24 +3090,61 @@
         </p:blipFill>
         <p:spPr>
           <a:xfrm>
-            <a:off x="7438438" y="1287065"/>
-            <a:ext cx="3114675" cy="1657350"/>
+            <a:off x="4002065" y="6082449"/>
+            <a:ext cx="2503301" cy="725446"/>
           </a:xfrm>
           <a:prstGeom prst="rect">
             <a:avLst/>
           </a:prstGeom>
         </p:spPr>
       </p:pic>
+      <p:sp>
+        <p:nvSpPr>
+          <p:cNvPr id="9" name="TextBox 8"/>
+          <p:cNvSpPr txBox="1"/>
+          <p:nvPr/>
+        </p:nvSpPr>
+        <p:spPr>
+          <a:xfrm>
+            <a:off x="100208" y="2361156"/>
+            <a:ext cx="3008324" cy="646331"/>
+          </a:xfrm>
+          <a:prstGeom prst="rect">
+            <a:avLst/>
+          </a:prstGeom>
+          <a:noFill/>
+        </p:spPr>
+        <p:txBody>
+          <a:bodyPr wrap="none" rtlCol="0">
+            <a:spAutoFit/>
+          </a:bodyPr>
+          <a:lstStyle/>
+          <a:p>
+            <a:r>
+              <a:rPr lang="en-US" dirty="0"/>
+              <a:t>The action listeners are added</a:t>
+            </a:r>
+          </a:p>
+          <a:p>
+            <a:r>
+              <a:rPr lang="en-US" dirty="0"/>
+              <a:t>after construction…</a:t>
+            </a:r>
+          </a:p>
+        </p:txBody>
+      </p:sp>
       <p:cxnSp>
         <p:nvCxnSpPr>
-          <p:cNvPr id="14" name="Straight Arrow Connector 13"/>
-          <p:cNvCxnSpPr/>
+          <p:cNvPr id="11" name="Straight Arrow Connector 10"/>
+          <p:cNvCxnSpPr>
+            <a:cxnSpLocks/>
+          </p:cNvCxnSpPr>
           <p:nvPr/>
         </p:nvCxnSpPr>
         <p:spPr>
-          <a:xfrm flipV="1">
-            <a:off x="5931074" y="2115740"/>
-            <a:ext cx="1390389" cy="45001"/>
+          <a:xfrm>
+            <a:off x="3108532" y="5956126"/>
+            <a:ext cx="3367425" cy="18789"/>
           </a:xfrm>
           <a:prstGeom prst="straightConnector1">
             <a:avLst/>
@@ -3072,14 +3170,14 @@
       </p:cxnSp>
       <p:sp>
         <p:nvSpPr>
-          <p:cNvPr id="15" name="TextBox 14"/>
+          <p:cNvPr id="13" name="TextBox 12"/>
           <p:cNvSpPr txBox="1"/>
           <p:nvPr/>
         </p:nvSpPr>
         <p:spPr>
           <a:xfrm>
-            <a:off x="1491419" y="275573"/>
-            <a:ext cx="5578771" cy="461665"/>
+            <a:off x="732774" y="5361139"/>
+            <a:ext cx="2656625" cy="646331"/>
           </a:xfrm>
           <a:prstGeom prst="rect">
             <a:avLst/>
@@ -3093,43 +3191,872 @@
           <a:lstStyle/>
           <a:p>
             <a:r>
-              <a:rPr lang="en-US" sz="2400" dirty="0">
-                <a:latin typeface="Arial" panose="020B0604020202020204" pitchFamily="34" charset="0"/>
-                <a:cs typeface="Arial" panose="020B0604020202020204" pitchFamily="34" charset="0"/>
-              </a:rPr>
-              <a:t>No error message with invalid integer…</a:t>
-            </a:r>
-          </a:p>
-        </p:txBody>
-      </p:sp>
+              <a:rPr lang="en-US" dirty="0"/>
+              <a:t>Kick off the calculation on </a:t>
+            </a:r>
+          </a:p>
+          <a:p>
+            <a:r>
+              <a:rPr lang="en-US" dirty="0"/>
+              <a:t>the non-AWT thread…</a:t>
+            </a:r>
+          </a:p>
+        </p:txBody>
+      </p:sp>
+    </p:spTree>
+    <p:extLst>
+      <p:ext uri="{BB962C8B-B14F-4D97-AF65-F5344CB8AC3E}">
+        <p14:creationId xmlns:p14="http://schemas.microsoft.com/office/powerpoint/2010/main" val="3936695301"/>
+      </p:ext>
+    </p:extLst>
+  </p:cSld>
+  <p:clrMapOvr>
+    <a:masterClrMapping/>
+  </p:clrMapOvr>
+</p:sld>
+</file>
+
+<file path=ppt/slides/slide11.xml><?xml version="1.0" encoding="utf-8"?>
+<p:sld xmlns:a="http://schemas.openxmlformats.org/drawingml/2006/main" xmlns:r="http://schemas.openxmlformats.org/officeDocument/2006/relationships" xmlns:p="http://schemas.openxmlformats.org/presentationml/2006/main">
+  <p:cSld>
+    <p:spTree>
+      <p:nvGrpSpPr>
+        <p:cNvPr id="1" name=""/>
+        <p:cNvGrpSpPr/>
+        <p:nvPr/>
+      </p:nvGrpSpPr>
+      <p:grpSpPr>
+        <a:xfrm>
+          <a:off x="0" y="0"/>
+          <a:ext cx="0" cy="0"/>
+          <a:chOff x="0" y="0"/>
+          <a:chExt cx="0" cy="0"/>
+        </a:xfrm>
+      </p:grpSpPr>
       <p:pic>
         <p:nvPicPr>
-          <p:cNvPr id="16" name="Picture 15"/>
+          <p:cNvPr id="5" name="Picture 4"/>
           <p:cNvPicPr>
             <a:picLocks noChangeAspect="1"/>
           </p:cNvPicPr>
           <p:nvPr/>
         </p:nvPicPr>
         <p:blipFill>
-          <a:blip r:embed="rId4"/>
+          <a:blip r:embed="rId2"/>
           <a:stretch>
             <a:fillRect/>
           </a:stretch>
         </p:blipFill>
         <p:spPr>
           <a:xfrm>
-            <a:off x="169101" y="4281420"/>
-            <a:ext cx="12192000" cy="2082297"/>
+            <a:off x="495300" y="2024062"/>
+            <a:ext cx="11201400" cy="2809875"/>
           </a:xfrm>
           <a:prstGeom prst="rect">
             <a:avLst/>
           </a:prstGeom>
         </p:spPr>
       </p:pic>
+      <p:sp>
+        <p:nvSpPr>
+          <p:cNvPr id="6" name="TextBox 5"/>
+          <p:cNvSpPr txBox="1"/>
+          <p:nvPr/>
+        </p:nvSpPr>
+        <p:spPr>
+          <a:xfrm>
+            <a:off x="951978" y="613775"/>
+            <a:ext cx="8977779" cy="923330"/>
+          </a:xfrm>
+          <a:prstGeom prst="rect">
+            <a:avLst/>
+          </a:prstGeom>
+          <a:noFill/>
+        </p:spPr>
+        <p:txBody>
+          <a:bodyPr wrap="none" rtlCol="0">
+            <a:spAutoFit/>
+          </a:bodyPr>
+          <a:lstStyle/>
+          <a:p>
+            <a:r>
+              <a:rPr lang="en-US" dirty="0">
+                <a:latin typeface="Arial" panose="020B0604020202020204" pitchFamily="34" charset="0"/>
+                <a:cs typeface="Arial" panose="020B0604020202020204" pitchFamily="34" charset="0"/>
+              </a:rPr>
+              <a:t>The cancel button just sets a flag (like cancel in a </a:t>
+            </a:r>
+            <a:r>
+              <a:rPr lang="en-US" dirty="0" err="1">
+                <a:latin typeface="Arial" panose="020B0604020202020204" pitchFamily="34" charset="0"/>
+                <a:cs typeface="Arial" panose="020B0604020202020204" pitchFamily="34" charset="0"/>
+              </a:rPr>
+              <a:t>FutureTask</a:t>
+            </a:r>
+            <a:r>
+              <a:rPr lang="en-US" dirty="0">
+                <a:latin typeface="Arial" panose="020B0604020202020204" pitchFamily="34" charset="0"/>
+                <a:cs typeface="Arial" panose="020B0604020202020204" pitchFamily="34" charset="0"/>
+              </a:rPr>
+              <a:t>).</a:t>
+            </a:r>
+          </a:p>
+          <a:p>
+            <a:endParaRPr lang="en-US" dirty="0">
+              <a:latin typeface="Arial" panose="020B0604020202020204" pitchFamily="34" charset="0"/>
+              <a:cs typeface="Arial" panose="020B0604020202020204" pitchFamily="34" charset="0"/>
+            </a:endParaRPr>
+          </a:p>
+          <a:p>
+            <a:r>
+              <a:rPr lang="en-US" dirty="0">
+                <a:latin typeface="Arial" panose="020B0604020202020204" pitchFamily="34" charset="0"/>
+                <a:cs typeface="Arial" panose="020B0604020202020204" pitchFamily="34" charset="0"/>
+              </a:rPr>
+              <a:t>We’ve made sure the  </a:t>
+            </a:r>
+            <a:r>
+              <a:rPr lang="en-US" dirty="0" err="1">
+                <a:latin typeface="Arial" panose="020B0604020202020204" pitchFamily="34" charset="0"/>
+                <a:cs typeface="Arial" panose="020B0604020202020204" pitchFamily="34" charset="0"/>
+              </a:rPr>
+              <a:t>boolean</a:t>
+            </a:r>
+            <a:r>
+              <a:rPr lang="en-US" dirty="0">
+                <a:latin typeface="Arial" panose="020B0604020202020204" pitchFamily="34" charset="0"/>
+                <a:cs typeface="Arial" panose="020B0604020202020204" pitchFamily="34" charset="0"/>
+              </a:rPr>
+              <a:t> cancel is volatile so that it will be visible across threads </a:t>
+            </a:r>
+          </a:p>
+        </p:txBody>
+      </p:sp>
     </p:spTree>
     <p:extLst>
       <p:ext uri="{BB962C8B-B14F-4D97-AF65-F5344CB8AC3E}">
-        <p14:creationId xmlns:p14="http://schemas.microsoft.com/office/powerpoint/2010/main" val="250650811"/>
+        <p14:creationId xmlns:p14="http://schemas.microsoft.com/office/powerpoint/2010/main" val="2972556195"/>
+      </p:ext>
+    </p:extLst>
+  </p:cSld>
+  <p:clrMapOvr>
+    <a:masterClrMapping/>
+  </p:clrMapOvr>
+</p:sld>
+</file>
+
+<file path=ppt/slides/slide12.xml><?xml version="1.0" encoding="utf-8"?>
+<p:sld xmlns:a="http://schemas.openxmlformats.org/drawingml/2006/main" xmlns:r="http://schemas.openxmlformats.org/officeDocument/2006/relationships" xmlns:p="http://schemas.openxmlformats.org/presentationml/2006/main">
+  <p:cSld>
+    <p:spTree>
+      <p:nvGrpSpPr>
+        <p:cNvPr id="1" name=""/>
+        <p:cNvGrpSpPr/>
+        <p:nvPr/>
+      </p:nvGrpSpPr>
+      <p:grpSpPr>
+        <a:xfrm>
+          <a:off x="0" y="0"/>
+          <a:ext cx="0" cy="0"/>
+          <a:chOff x="0" y="0"/>
+          <a:chExt cx="0" cy="0"/>
+        </a:xfrm>
+      </p:grpSpPr>
+      <p:pic>
+        <p:nvPicPr>
+          <p:cNvPr id="4" name="Picture 3"/>
+          <p:cNvPicPr>
+            <a:picLocks noChangeAspect="1"/>
+          </p:cNvPicPr>
+          <p:nvPr/>
+        </p:nvPicPr>
+        <p:blipFill>
+          <a:blip r:embed="rId2"/>
+          <a:stretch>
+            <a:fillRect/>
+          </a:stretch>
+        </p:blipFill>
+        <p:spPr>
+          <a:xfrm>
+            <a:off x="695194" y="1815149"/>
+            <a:ext cx="6642579" cy="4179534"/>
+          </a:xfrm>
+          <a:prstGeom prst="rect">
+            <a:avLst/>
+          </a:prstGeom>
+        </p:spPr>
+      </p:pic>
+      <p:cxnSp>
+        <p:nvCxnSpPr>
+          <p:cNvPr id="6" name="Straight Arrow Connector 5"/>
+          <p:cNvCxnSpPr/>
+          <p:nvPr/>
+        </p:nvCxnSpPr>
+        <p:spPr>
+          <a:xfrm flipH="1">
+            <a:off x="3582444" y="3369503"/>
+            <a:ext cx="1283918" cy="607512"/>
+          </a:xfrm>
+          <a:prstGeom prst="straightConnector1">
+            <a:avLst/>
+          </a:prstGeom>
+          <a:ln>
+            <a:tailEnd type="triangle"/>
+          </a:ln>
+        </p:spPr>
+        <p:style>
+          <a:lnRef idx="1">
+            <a:schemeClr val="accent1"/>
+          </a:lnRef>
+          <a:fillRef idx="0">
+            <a:schemeClr val="accent1"/>
+          </a:fillRef>
+          <a:effectRef idx="0">
+            <a:schemeClr val="accent1"/>
+          </a:effectRef>
+          <a:fontRef idx="minor">
+            <a:schemeClr val="tx1"/>
+          </a:fontRef>
+        </p:style>
+      </p:cxnSp>
+      <p:sp>
+        <p:nvSpPr>
+          <p:cNvPr id="7" name="TextBox 6"/>
+          <p:cNvSpPr txBox="1"/>
+          <p:nvPr/>
+        </p:nvSpPr>
+        <p:spPr>
+          <a:xfrm>
+            <a:off x="5022937" y="3125243"/>
+            <a:ext cx="6194966" cy="369332"/>
+          </a:xfrm>
+          <a:prstGeom prst="rect">
+            <a:avLst/>
+          </a:prstGeom>
+          <a:noFill/>
+        </p:spPr>
+        <p:txBody>
+          <a:bodyPr wrap="none" rtlCol="0">
+            <a:spAutoFit/>
+          </a:bodyPr>
+          <a:lstStyle/>
+          <a:p>
+            <a:r>
+              <a:rPr lang="en-US" dirty="0">
+                <a:latin typeface="Arial" panose="020B0604020202020204" pitchFamily="34" charset="0"/>
+                <a:cs typeface="Arial" panose="020B0604020202020204" pitchFamily="34" charset="0"/>
+              </a:rPr>
+              <a:t>I might have called this </a:t>
+            </a:r>
+            <a:r>
+              <a:rPr lang="en-US" dirty="0" err="1">
+                <a:latin typeface="Arial" panose="020B0604020202020204" pitchFamily="34" charset="0"/>
+                <a:cs typeface="Arial" panose="020B0604020202020204" pitchFamily="34" charset="0"/>
+              </a:rPr>
+              <a:t>PrimeWorker</a:t>
+            </a:r>
+            <a:r>
+              <a:rPr lang="en-US" dirty="0">
+                <a:latin typeface="Arial" panose="020B0604020202020204" pitchFamily="34" charset="0"/>
+                <a:cs typeface="Arial" panose="020B0604020202020204" pitchFamily="34" charset="0"/>
+              </a:rPr>
+              <a:t> or something like that</a:t>
+            </a:r>
+          </a:p>
+        </p:txBody>
+      </p:sp>
+      <p:cxnSp>
+        <p:nvCxnSpPr>
+          <p:cNvPr id="9" name="Straight Arrow Connector 8"/>
+          <p:cNvCxnSpPr/>
+          <p:nvPr/>
+        </p:nvCxnSpPr>
+        <p:spPr>
+          <a:xfrm flipH="1">
+            <a:off x="2743200" y="1453018"/>
+            <a:ext cx="970767" cy="457200"/>
+          </a:xfrm>
+          <a:prstGeom prst="straightConnector1">
+            <a:avLst/>
+          </a:prstGeom>
+          <a:ln>
+            <a:tailEnd type="triangle"/>
+          </a:ln>
+        </p:spPr>
+        <p:style>
+          <a:lnRef idx="1">
+            <a:schemeClr val="accent1"/>
+          </a:lnRef>
+          <a:fillRef idx="0">
+            <a:schemeClr val="accent1"/>
+          </a:fillRef>
+          <a:effectRef idx="0">
+            <a:schemeClr val="accent1"/>
+          </a:effectRef>
+          <a:fontRef idx="minor">
+            <a:schemeClr val="tx1"/>
+          </a:fontRef>
+        </p:style>
+      </p:cxnSp>
+      <p:sp>
+        <p:nvSpPr>
+          <p:cNvPr id="11" name="TextBox 10"/>
+          <p:cNvSpPr txBox="1"/>
+          <p:nvPr/>
+        </p:nvSpPr>
+        <p:spPr>
+          <a:xfrm>
+            <a:off x="3795386" y="1315232"/>
+            <a:ext cx="1608517" cy="369332"/>
+          </a:xfrm>
+          <a:prstGeom prst="rect">
+            <a:avLst/>
+          </a:prstGeom>
+          <a:noFill/>
+        </p:spPr>
+        <p:txBody>
+          <a:bodyPr wrap="none" rtlCol="0">
+            <a:spAutoFit/>
+          </a:bodyPr>
+          <a:lstStyle/>
+          <a:p>
+            <a:r>
+              <a:rPr lang="en-US" dirty="0"/>
+              <a:t>Helper method</a:t>
+            </a:r>
+          </a:p>
+        </p:txBody>
+      </p:sp>
+      <p:sp>
+        <p:nvSpPr>
+          <p:cNvPr id="12" name="TextBox 11"/>
+          <p:cNvSpPr txBox="1"/>
+          <p:nvPr/>
+        </p:nvSpPr>
+        <p:spPr>
+          <a:xfrm>
+            <a:off x="977030" y="275573"/>
+            <a:ext cx="7063087" cy="369332"/>
+          </a:xfrm>
+          <a:prstGeom prst="rect">
+            <a:avLst/>
+          </a:prstGeom>
+          <a:noFill/>
+        </p:spPr>
+        <p:txBody>
+          <a:bodyPr wrap="none" rtlCol="0">
+            <a:spAutoFit/>
+          </a:bodyPr>
+          <a:lstStyle/>
+          <a:p>
+            <a:r>
+              <a:rPr lang="en-US" dirty="0"/>
+              <a:t>The Worker class makes an immutable copy of the work that it has to do…</a:t>
+            </a:r>
+          </a:p>
+        </p:txBody>
+      </p:sp>
+    </p:spTree>
+    <p:extLst>
+      <p:ext uri="{BB962C8B-B14F-4D97-AF65-F5344CB8AC3E}">
+        <p14:creationId xmlns:p14="http://schemas.microsoft.com/office/powerpoint/2010/main" val="2043616026"/>
+      </p:ext>
+    </p:extLst>
+  </p:cSld>
+  <p:clrMapOvr>
+    <a:masterClrMapping/>
+  </p:clrMapOvr>
+</p:sld>
+</file>
+
+<file path=ppt/slides/slide13.xml><?xml version="1.0" encoding="utf-8"?>
+<p:sld xmlns:a="http://schemas.openxmlformats.org/drawingml/2006/main" xmlns:r="http://schemas.openxmlformats.org/officeDocument/2006/relationships" xmlns:p="http://schemas.openxmlformats.org/presentationml/2006/main">
+  <p:cSld>
+    <p:spTree>
+      <p:nvGrpSpPr>
+        <p:cNvPr id="1" name=""/>
+        <p:cNvGrpSpPr/>
+        <p:nvPr/>
+      </p:nvGrpSpPr>
+      <p:grpSpPr>
+        <a:xfrm>
+          <a:off x="0" y="0"/>
+          <a:ext cx="0" cy="0"/>
+          <a:chOff x="0" y="0"/>
+          <a:chExt cx="0" cy="0"/>
+        </a:xfrm>
+      </p:grpSpPr>
+      <p:pic>
+        <p:nvPicPr>
+          <p:cNvPr id="4" name="Picture 3"/>
+          <p:cNvPicPr>
+            <a:picLocks noChangeAspect="1"/>
+          </p:cNvPicPr>
+          <p:nvPr/>
+        </p:nvPicPr>
+        <p:blipFill>
+          <a:blip r:embed="rId2"/>
+          <a:stretch>
+            <a:fillRect/>
+          </a:stretch>
+        </p:blipFill>
+        <p:spPr>
+          <a:xfrm>
+            <a:off x="1315333" y="356991"/>
+            <a:ext cx="8768120" cy="6289056"/>
+          </a:xfrm>
+          <a:prstGeom prst="rect">
+            <a:avLst/>
+          </a:prstGeom>
+        </p:spPr>
+      </p:pic>
+      <p:sp>
+        <p:nvSpPr>
+          <p:cNvPr id="5" name="TextBox 4"/>
+          <p:cNvSpPr txBox="1"/>
+          <p:nvPr/>
+        </p:nvSpPr>
+        <p:spPr>
+          <a:xfrm>
+            <a:off x="701461" y="43841"/>
+            <a:ext cx="5009128" cy="369332"/>
+          </a:xfrm>
+          <a:prstGeom prst="rect">
+            <a:avLst/>
+          </a:prstGeom>
+          <a:noFill/>
+        </p:spPr>
+        <p:txBody>
+          <a:bodyPr wrap="none" rtlCol="0">
+            <a:spAutoFit/>
+          </a:bodyPr>
+          <a:lstStyle/>
+          <a:p>
+            <a:r>
+              <a:rPr lang="en-US" dirty="0"/>
+              <a:t>First part of the run method…  does the calculation </a:t>
+            </a:r>
+          </a:p>
+        </p:txBody>
+      </p:sp>
+      <p:cxnSp>
+        <p:nvCxnSpPr>
+          <p:cNvPr id="7" name="Straight Arrow Connector 6"/>
+          <p:cNvCxnSpPr/>
+          <p:nvPr/>
+        </p:nvCxnSpPr>
+        <p:spPr>
+          <a:xfrm flipH="1" flipV="1">
+            <a:off x="5710589" y="1252603"/>
+            <a:ext cx="921943" cy="6263"/>
+          </a:xfrm>
+          <a:prstGeom prst="straightConnector1">
+            <a:avLst/>
+          </a:prstGeom>
+          <a:ln>
+            <a:tailEnd type="triangle"/>
+          </a:ln>
+        </p:spPr>
+        <p:style>
+          <a:lnRef idx="1">
+            <a:schemeClr val="accent1"/>
+          </a:lnRef>
+          <a:fillRef idx="0">
+            <a:schemeClr val="accent1"/>
+          </a:fillRef>
+          <a:effectRef idx="0">
+            <a:schemeClr val="accent1"/>
+          </a:effectRef>
+          <a:fontRef idx="minor">
+            <a:schemeClr val="tx1"/>
+          </a:fontRef>
+        </p:style>
+      </p:cxnSp>
+      <p:sp>
+        <p:nvSpPr>
+          <p:cNvPr id="8" name="TextBox 7"/>
+          <p:cNvSpPr txBox="1"/>
+          <p:nvPr/>
+        </p:nvSpPr>
+        <p:spPr>
+          <a:xfrm>
+            <a:off x="6670110" y="1070976"/>
+            <a:ext cx="4893134" cy="369332"/>
+          </a:xfrm>
+          <a:prstGeom prst="rect">
+            <a:avLst/>
+          </a:prstGeom>
+          <a:noFill/>
+        </p:spPr>
+        <p:txBody>
+          <a:bodyPr wrap="none" rtlCol="0">
+            <a:spAutoFit/>
+          </a:bodyPr>
+          <a:lstStyle/>
+          <a:p>
+            <a:r>
+              <a:rPr lang="en-US" dirty="0"/>
+              <a:t>List is stack confined; make sure it doesn’t escape!</a:t>
+            </a:r>
+          </a:p>
+        </p:txBody>
+      </p:sp>
+      <p:cxnSp>
+        <p:nvCxnSpPr>
+          <p:cNvPr id="10" name="Straight Arrow Connector 9"/>
+          <p:cNvCxnSpPr/>
+          <p:nvPr/>
+        </p:nvCxnSpPr>
+        <p:spPr>
+          <a:xfrm flipH="1" flipV="1">
+            <a:off x="4841310" y="1559490"/>
+            <a:ext cx="795402" cy="206680"/>
+          </a:xfrm>
+          <a:prstGeom prst="straightConnector1">
+            <a:avLst/>
+          </a:prstGeom>
+          <a:ln>
+            <a:tailEnd type="triangle"/>
+          </a:ln>
+        </p:spPr>
+        <p:style>
+          <a:lnRef idx="1">
+            <a:schemeClr val="accent1"/>
+          </a:lnRef>
+          <a:fillRef idx="0">
+            <a:schemeClr val="accent1"/>
+          </a:fillRef>
+          <a:effectRef idx="0">
+            <a:schemeClr val="accent1"/>
+          </a:effectRef>
+          <a:fontRef idx="minor">
+            <a:schemeClr val="tx1"/>
+          </a:fontRef>
+        </p:style>
+      </p:cxnSp>
+      <p:sp>
+        <p:nvSpPr>
+          <p:cNvPr id="11" name="TextBox 10"/>
+          <p:cNvSpPr txBox="1"/>
+          <p:nvPr/>
+        </p:nvSpPr>
+        <p:spPr>
+          <a:xfrm>
+            <a:off x="5710589" y="1709803"/>
+            <a:ext cx="3920240" cy="369332"/>
+          </a:xfrm>
+          <a:prstGeom prst="rect">
+            <a:avLst/>
+          </a:prstGeom>
+          <a:noFill/>
+        </p:spPr>
+        <p:txBody>
+          <a:bodyPr wrap="none" rtlCol="0">
+            <a:spAutoFit/>
+          </a:bodyPr>
+          <a:lstStyle/>
+          <a:p>
+            <a:r>
+              <a:rPr lang="en-US" dirty="0"/>
+              <a:t>Check for the cancel with every number</a:t>
+            </a:r>
+          </a:p>
+        </p:txBody>
+      </p:sp>
+      <p:cxnSp>
+        <p:nvCxnSpPr>
+          <p:cNvPr id="13" name="Straight Arrow Connector 12"/>
+          <p:cNvCxnSpPr/>
+          <p:nvPr/>
+        </p:nvCxnSpPr>
+        <p:spPr>
+          <a:xfrm flipV="1">
+            <a:off x="2423786" y="2893512"/>
+            <a:ext cx="920663" cy="375781"/>
+          </a:xfrm>
+          <a:prstGeom prst="straightConnector1">
+            <a:avLst/>
+          </a:prstGeom>
+          <a:ln>
+            <a:tailEnd type="triangle"/>
+          </a:ln>
+        </p:spPr>
+        <p:style>
+          <a:lnRef idx="1">
+            <a:schemeClr val="accent1"/>
+          </a:lnRef>
+          <a:fillRef idx="0">
+            <a:schemeClr val="accent1"/>
+          </a:fillRef>
+          <a:effectRef idx="0">
+            <a:schemeClr val="accent1"/>
+          </a:effectRef>
+          <a:fontRef idx="minor">
+            <a:schemeClr val="tx1"/>
+          </a:fontRef>
+        </p:style>
+      </p:cxnSp>
+      <p:sp>
+        <p:nvSpPr>
+          <p:cNvPr id="14" name="TextBox 13"/>
+          <p:cNvSpPr txBox="1"/>
+          <p:nvPr/>
+        </p:nvSpPr>
+        <p:spPr>
+          <a:xfrm>
+            <a:off x="457201" y="3306872"/>
+            <a:ext cx="2851935" cy="923330"/>
+          </a:xfrm>
+          <a:prstGeom prst="rect">
+            <a:avLst/>
+          </a:prstGeom>
+          <a:noFill/>
+        </p:spPr>
+        <p:txBody>
+          <a:bodyPr wrap="none" rtlCol="0">
+            <a:spAutoFit/>
+          </a:bodyPr>
+          <a:lstStyle/>
+          <a:p>
+            <a:r>
+              <a:rPr lang="en-US" dirty="0"/>
+              <a:t>Only update twice a second!</a:t>
+            </a:r>
+          </a:p>
+          <a:p>
+            <a:r>
+              <a:rPr lang="en-US" dirty="0"/>
+              <a:t>Continuous updates will</a:t>
+            </a:r>
+          </a:p>
+          <a:p>
+            <a:r>
+              <a:rPr lang="en-US" dirty="0"/>
+              <a:t>freeze the AWT thread</a:t>
+            </a:r>
+          </a:p>
+        </p:txBody>
+      </p:sp>
+    </p:spTree>
+    <p:extLst>
+      <p:ext uri="{BB962C8B-B14F-4D97-AF65-F5344CB8AC3E}">
+        <p14:creationId xmlns:p14="http://schemas.microsoft.com/office/powerpoint/2010/main" val="3541914438"/>
+      </p:ext>
+    </p:extLst>
+  </p:cSld>
+  <p:clrMapOvr>
+    <a:masterClrMapping/>
+  </p:clrMapOvr>
+</p:sld>
+</file>
+
+<file path=ppt/slides/slide14.xml><?xml version="1.0" encoding="utf-8"?>
+<p:sld xmlns:a="http://schemas.openxmlformats.org/drawingml/2006/main" xmlns:r="http://schemas.openxmlformats.org/officeDocument/2006/relationships" xmlns:p="http://schemas.openxmlformats.org/presentationml/2006/main">
+  <p:cSld>
+    <p:spTree>
+      <p:nvGrpSpPr>
+        <p:cNvPr id="1" name=""/>
+        <p:cNvGrpSpPr/>
+        <p:nvPr/>
+      </p:nvGrpSpPr>
+      <p:grpSpPr>
+        <a:xfrm>
+          <a:off x="0" y="0"/>
+          <a:ext cx="0" cy="0"/>
+          <a:chOff x="0" y="0"/>
+          <a:chExt cx="0" cy="0"/>
+        </a:xfrm>
+      </p:grpSpPr>
+      <p:pic>
+        <p:nvPicPr>
+          <p:cNvPr id="4" name="Picture 3"/>
+          <p:cNvPicPr>
+            <a:picLocks noChangeAspect="1"/>
+          </p:cNvPicPr>
+          <p:nvPr/>
+        </p:nvPicPr>
+        <p:blipFill>
+          <a:blip r:embed="rId2"/>
+          <a:stretch>
+            <a:fillRect/>
+          </a:stretch>
+        </p:blipFill>
+        <p:spPr>
+          <a:xfrm>
+            <a:off x="581250" y="601248"/>
+            <a:ext cx="10504284" cy="6227321"/>
+          </a:xfrm>
+          <a:prstGeom prst="rect">
+            <a:avLst/>
+          </a:prstGeom>
+        </p:spPr>
+      </p:pic>
+      <p:sp>
+        <p:nvSpPr>
+          <p:cNvPr id="5" name="TextBox 4"/>
+          <p:cNvSpPr txBox="1"/>
+          <p:nvPr/>
+        </p:nvSpPr>
+        <p:spPr>
+          <a:xfrm>
+            <a:off x="1208762" y="118997"/>
+            <a:ext cx="5660524" cy="369332"/>
+          </a:xfrm>
+          <a:prstGeom prst="rect">
+            <a:avLst/>
+          </a:prstGeom>
+          <a:noFill/>
+        </p:spPr>
+        <p:txBody>
+          <a:bodyPr wrap="none" rtlCol="0">
+            <a:spAutoFit/>
+          </a:bodyPr>
+          <a:lstStyle/>
+          <a:p>
+            <a:r>
+              <a:rPr lang="en-US" dirty="0">
+                <a:latin typeface="Arial" panose="020B0604020202020204" pitchFamily="34" charset="0"/>
+                <a:cs typeface="Arial" panose="020B0604020202020204" pitchFamily="34" charset="0"/>
+              </a:rPr>
+              <a:t>Second part of the run method…. Show final results…</a:t>
+            </a:r>
+          </a:p>
+        </p:txBody>
+      </p:sp>
+      <p:cxnSp>
+        <p:nvCxnSpPr>
+          <p:cNvPr id="7" name="Straight Arrow Connector 6"/>
+          <p:cNvCxnSpPr/>
+          <p:nvPr/>
+        </p:nvCxnSpPr>
+        <p:spPr>
+          <a:xfrm flipH="1">
+            <a:off x="5668027" y="958241"/>
+            <a:ext cx="1096028" cy="12526"/>
+          </a:xfrm>
+          <a:prstGeom prst="straightConnector1">
+            <a:avLst/>
+          </a:prstGeom>
+          <a:ln>
+            <a:tailEnd type="triangle"/>
+          </a:ln>
+        </p:spPr>
+        <p:style>
+          <a:lnRef idx="1">
+            <a:schemeClr val="accent1"/>
+          </a:lnRef>
+          <a:fillRef idx="0">
+            <a:schemeClr val="accent1"/>
+          </a:fillRef>
+          <a:effectRef idx="0">
+            <a:schemeClr val="accent1"/>
+          </a:effectRef>
+          <a:fontRef idx="minor">
+            <a:schemeClr val="tx1"/>
+          </a:fontRef>
+        </p:style>
+      </p:cxnSp>
+      <p:sp>
+        <p:nvSpPr>
+          <p:cNvPr id="8" name="TextBox 7"/>
+          <p:cNvSpPr txBox="1"/>
+          <p:nvPr/>
+        </p:nvSpPr>
+        <p:spPr>
+          <a:xfrm>
+            <a:off x="6832949" y="764088"/>
+            <a:ext cx="2417072" cy="369332"/>
+          </a:xfrm>
+          <a:prstGeom prst="rect">
+            <a:avLst/>
+          </a:prstGeom>
+          <a:noFill/>
+        </p:spPr>
+        <p:txBody>
+          <a:bodyPr wrap="none" rtlCol="0">
+            <a:spAutoFit/>
+          </a:bodyPr>
+          <a:lstStyle/>
+          <a:p>
+            <a:r>
+              <a:rPr lang="en-US" dirty="0"/>
+              <a:t>Prepare the input string</a:t>
+            </a:r>
+          </a:p>
+        </p:txBody>
+      </p:sp>
+      <p:cxnSp>
+        <p:nvCxnSpPr>
+          <p:cNvPr id="10" name="Straight Arrow Connector 9"/>
+          <p:cNvCxnSpPr/>
+          <p:nvPr/>
+        </p:nvCxnSpPr>
+        <p:spPr>
+          <a:xfrm flipH="1">
+            <a:off x="8060499" y="4546948"/>
+            <a:ext cx="419622" cy="1183710"/>
+          </a:xfrm>
+          <a:prstGeom prst="straightConnector1">
+            <a:avLst/>
+          </a:prstGeom>
+          <a:ln>
+            <a:tailEnd type="triangle"/>
+          </a:ln>
+        </p:spPr>
+        <p:style>
+          <a:lnRef idx="1">
+            <a:schemeClr val="accent1"/>
+          </a:lnRef>
+          <a:fillRef idx="0">
+            <a:schemeClr val="accent1"/>
+          </a:fillRef>
+          <a:effectRef idx="0">
+            <a:schemeClr val="accent1"/>
+          </a:effectRef>
+          <a:fontRef idx="minor">
+            <a:schemeClr val="tx1"/>
+          </a:fontRef>
+        </p:style>
+      </p:cxnSp>
+      <p:sp>
+        <p:nvSpPr>
+          <p:cNvPr id="11" name="TextBox 10"/>
+          <p:cNvSpPr txBox="1"/>
+          <p:nvPr/>
+        </p:nvSpPr>
+        <p:spPr>
+          <a:xfrm>
+            <a:off x="8135655" y="3883067"/>
+            <a:ext cx="2801793" cy="646331"/>
+          </a:xfrm>
+          <a:prstGeom prst="rect">
+            <a:avLst/>
+          </a:prstGeom>
+          <a:noFill/>
+        </p:spPr>
+        <p:txBody>
+          <a:bodyPr wrap="none" rtlCol="0">
+            <a:spAutoFit/>
+          </a:bodyPr>
+          <a:lstStyle/>
+          <a:p>
+            <a:r>
+              <a:rPr lang="en-US" dirty="0"/>
+              <a:t>Publish an immutable string</a:t>
+            </a:r>
+          </a:p>
+          <a:p>
+            <a:r>
+              <a:rPr lang="en-US" dirty="0"/>
+              <a:t>Back to the AWT thread….</a:t>
+            </a:r>
+          </a:p>
+        </p:txBody>
+      </p:sp>
+    </p:spTree>
+    <p:extLst>
+      <p:ext uri="{BB962C8B-B14F-4D97-AF65-F5344CB8AC3E}">
+        <p14:creationId xmlns:p14="http://schemas.microsoft.com/office/powerpoint/2010/main" val="129287250"/>
       </p:ext>
     </p:extLst>
   </p:cSld>
@@ -3158,7 +4085,7 @@
       </p:grpSpPr>
       <p:pic>
         <p:nvPicPr>
-          <p:cNvPr id="4" name="Picture 3"/>
+          <p:cNvPr id="5" name="Picture 4"/>
           <p:cNvPicPr>
             <a:picLocks noChangeAspect="1"/>
           </p:cNvPicPr>
@@ -3172,8 +4099,8 @@
         </p:blipFill>
         <p:spPr>
           <a:xfrm>
-            <a:off x="588722" y="960369"/>
-            <a:ext cx="11183655" cy="5109880"/>
+            <a:off x="1791355" y="1080110"/>
+            <a:ext cx="3958092" cy="2071260"/>
           </a:xfrm>
           <a:prstGeom prst="rect">
             <a:avLst/>
@@ -3182,14 +4109,16 @@
       </p:pic>
       <p:cxnSp>
         <p:nvCxnSpPr>
-          <p:cNvPr id="6" name="Straight Arrow Connector 5"/>
-          <p:cNvCxnSpPr/>
+          <p:cNvPr id="9" name="Straight Arrow Connector 8"/>
+          <p:cNvCxnSpPr>
+            <a:cxnSpLocks/>
+          </p:cNvCxnSpPr>
           <p:nvPr/>
         </p:nvCxnSpPr>
         <p:spPr>
-          <a:xfrm flipH="1" flipV="1">
-            <a:off x="4008329" y="5661764"/>
-            <a:ext cx="1546964" cy="43841"/>
+          <a:xfrm flipV="1">
+            <a:off x="951980" y="1771750"/>
+            <a:ext cx="1091405" cy="144734"/>
           </a:xfrm>
           <a:prstGeom prst="straightConnector1">
             <a:avLst/>
@@ -3213,48 +4142,40 @@
           </a:fontRef>
         </p:style>
       </p:cxnSp>
-      <p:sp>
-        <p:nvSpPr>
-          <p:cNvPr id="7" name="TextBox 6"/>
-          <p:cNvSpPr txBox="1"/>
-          <p:nvPr/>
-        </p:nvSpPr>
-        <p:spPr>
-          <a:xfrm flipH="1">
-            <a:off x="5607276" y="5599135"/>
-            <a:ext cx="4964692" cy="369332"/>
+      <p:pic>
+        <p:nvPicPr>
+          <p:cNvPr id="12" name="Picture 11"/>
+          <p:cNvPicPr>
+            <a:picLocks noChangeAspect="1"/>
+          </p:cNvPicPr>
+          <p:nvPr/>
+        </p:nvPicPr>
+        <p:blipFill>
+          <a:blip r:embed="rId3"/>
+          <a:stretch>
+            <a:fillRect/>
+          </a:stretch>
+        </p:blipFill>
+        <p:spPr>
+          <a:xfrm>
+            <a:off x="7438438" y="1287065"/>
+            <a:ext cx="3114675" cy="1657350"/>
           </a:xfrm>
           <a:prstGeom prst="rect">
             <a:avLst/>
           </a:prstGeom>
-          <a:noFill/>
-        </p:spPr>
-        <p:txBody>
-          <a:bodyPr wrap="square" rtlCol="0">
-            <a:spAutoFit/>
-          </a:bodyPr>
-          <a:lstStyle/>
-          <a:p>
-            <a:r>
-              <a:rPr lang="en-US" dirty="0">
-                <a:latin typeface="Arial" panose="020B0604020202020204" pitchFamily="34" charset="0"/>
-                <a:cs typeface="Arial" panose="020B0604020202020204" pitchFamily="34" charset="0"/>
-              </a:rPr>
-              <a:t>Error goes to the console, not the GUI </a:t>
-            </a:r>
-          </a:p>
-        </p:txBody>
-      </p:sp>
+        </p:spPr>
+      </p:pic>
       <p:cxnSp>
         <p:nvCxnSpPr>
-          <p:cNvPr id="9" name="Straight Arrow Connector 8"/>
+          <p:cNvPr id="14" name="Straight Arrow Connector 13"/>
           <p:cNvCxnSpPr/>
           <p:nvPr/>
         </p:nvCxnSpPr>
         <p:spPr>
-          <a:xfrm flipH="1">
-            <a:off x="3764071" y="795403"/>
-            <a:ext cx="820455" cy="757824"/>
+          <a:xfrm flipV="1">
+            <a:off x="5931074" y="2115740"/>
+            <a:ext cx="1390389" cy="45001"/>
           </a:xfrm>
           <a:prstGeom prst="straightConnector1">
             <a:avLst/>
@@ -3280,14 +4201,14 @@
       </p:cxnSp>
       <p:sp>
         <p:nvSpPr>
-          <p:cNvPr id="10" name="TextBox 9"/>
+          <p:cNvPr id="15" name="TextBox 14"/>
           <p:cNvSpPr txBox="1"/>
           <p:nvPr/>
         </p:nvSpPr>
         <p:spPr>
           <a:xfrm>
-            <a:off x="4647157" y="526093"/>
-            <a:ext cx="3852337" cy="369332"/>
+            <a:off x="1491419" y="275573"/>
+            <a:ext cx="5578771" cy="461665"/>
           </a:xfrm>
           <a:prstGeom prst="rect">
             <a:avLst/>
@@ -3301,51 +4222,43 @@
           <a:lstStyle/>
           <a:p>
             <a:r>
-              <a:rPr lang="en-US" dirty="0">
+              <a:rPr lang="en-US" sz="2400" dirty="0">
                 <a:latin typeface="Arial" panose="020B0604020202020204" pitchFamily="34" charset="0"/>
                 <a:cs typeface="Arial" panose="020B0604020202020204" pitchFamily="34" charset="0"/>
               </a:rPr>
-              <a:t>This line throws if not a valid integer</a:t>
-            </a:r>
-          </a:p>
-        </p:txBody>
-      </p:sp>
-      <p:sp>
-        <p:nvSpPr>
-          <p:cNvPr id="11" name="TextBox 10"/>
-          <p:cNvSpPr txBox="1"/>
-          <p:nvPr/>
-        </p:nvSpPr>
-        <p:spPr>
-          <a:xfrm>
-            <a:off x="507305" y="56368"/>
-            <a:ext cx="6224781" cy="369332"/>
+              <a:t>No error message with invalid integer…</a:t>
+            </a:r>
+          </a:p>
+        </p:txBody>
+      </p:sp>
+      <p:pic>
+        <p:nvPicPr>
+          <p:cNvPr id="16" name="Picture 15"/>
+          <p:cNvPicPr>
+            <a:picLocks noChangeAspect="1"/>
+          </p:cNvPicPr>
+          <p:nvPr/>
+        </p:nvPicPr>
+        <p:blipFill>
+          <a:blip r:embed="rId4"/>
+          <a:stretch>
+            <a:fillRect/>
+          </a:stretch>
+        </p:blipFill>
+        <p:spPr>
+          <a:xfrm>
+            <a:off x="169101" y="4281420"/>
+            <a:ext cx="12192000" cy="2082297"/>
           </a:xfrm>
           <a:prstGeom prst="rect">
             <a:avLst/>
           </a:prstGeom>
-          <a:noFill/>
-        </p:spPr>
-        <p:txBody>
-          <a:bodyPr wrap="none" rtlCol="0">
-            <a:spAutoFit/>
-          </a:bodyPr>
-          <a:lstStyle/>
-          <a:p>
-            <a:r>
-              <a:rPr lang="en-US" dirty="0">
-                <a:latin typeface="Arial" panose="020B0604020202020204" pitchFamily="34" charset="0"/>
-                <a:cs typeface="Arial" panose="020B0604020202020204" pitchFamily="34" charset="0"/>
-              </a:rPr>
-              <a:t>GUI applications need to give information back to the users</a:t>
-            </a:r>
-          </a:p>
-        </p:txBody>
-      </p:sp>
+        </p:spPr>
+      </p:pic>
     </p:spTree>
     <p:extLst>
       <p:ext uri="{BB962C8B-B14F-4D97-AF65-F5344CB8AC3E}">
-        <p14:creationId xmlns:p14="http://schemas.microsoft.com/office/powerpoint/2010/main" val="2129589058"/>
+        <p14:creationId xmlns:p14="http://schemas.microsoft.com/office/powerpoint/2010/main" val="250650811"/>
       </p:ext>
     </p:extLst>
   </p:cSld>
@@ -3388,6 +4301,222 @@
         </p:blipFill>
         <p:spPr>
           <a:xfrm>
+            <a:off x="588722" y="941580"/>
+            <a:ext cx="11183655" cy="5109880"/>
+          </a:xfrm>
+          <a:prstGeom prst="rect">
+            <a:avLst/>
+          </a:prstGeom>
+        </p:spPr>
+      </p:pic>
+      <p:cxnSp>
+        <p:nvCxnSpPr>
+          <p:cNvPr id="6" name="Straight Arrow Connector 5"/>
+          <p:cNvCxnSpPr/>
+          <p:nvPr/>
+        </p:nvCxnSpPr>
+        <p:spPr>
+          <a:xfrm flipH="1" flipV="1">
+            <a:off x="4008329" y="5661764"/>
+            <a:ext cx="1546964" cy="43841"/>
+          </a:xfrm>
+          <a:prstGeom prst="straightConnector1">
+            <a:avLst/>
+          </a:prstGeom>
+          <a:ln>
+            <a:tailEnd type="triangle"/>
+          </a:ln>
+        </p:spPr>
+        <p:style>
+          <a:lnRef idx="1">
+            <a:schemeClr val="accent1"/>
+          </a:lnRef>
+          <a:fillRef idx="0">
+            <a:schemeClr val="accent1"/>
+          </a:fillRef>
+          <a:effectRef idx="0">
+            <a:schemeClr val="accent1"/>
+          </a:effectRef>
+          <a:fontRef idx="minor">
+            <a:schemeClr val="tx1"/>
+          </a:fontRef>
+        </p:style>
+      </p:cxnSp>
+      <p:sp>
+        <p:nvSpPr>
+          <p:cNvPr id="7" name="TextBox 6"/>
+          <p:cNvSpPr txBox="1"/>
+          <p:nvPr/>
+        </p:nvSpPr>
+        <p:spPr>
+          <a:xfrm flipH="1">
+            <a:off x="5607276" y="5599135"/>
+            <a:ext cx="4964692" cy="369332"/>
+          </a:xfrm>
+          <a:prstGeom prst="rect">
+            <a:avLst/>
+          </a:prstGeom>
+          <a:noFill/>
+        </p:spPr>
+        <p:txBody>
+          <a:bodyPr wrap="square" rtlCol="0">
+            <a:spAutoFit/>
+          </a:bodyPr>
+          <a:lstStyle/>
+          <a:p>
+            <a:r>
+              <a:rPr lang="en-US" dirty="0">
+                <a:latin typeface="Arial" panose="020B0604020202020204" pitchFamily="34" charset="0"/>
+                <a:cs typeface="Arial" panose="020B0604020202020204" pitchFamily="34" charset="0"/>
+              </a:rPr>
+              <a:t>Error goes to the console, not the GUI </a:t>
+            </a:r>
+          </a:p>
+        </p:txBody>
+      </p:sp>
+      <p:cxnSp>
+        <p:nvCxnSpPr>
+          <p:cNvPr id="9" name="Straight Arrow Connector 8"/>
+          <p:cNvCxnSpPr/>
+          <p:nvPr/>
+        </p:nvCxnSpPr>
+        <p:spPr>
+          <a:xfrm flipH="1">
+            <a:off x="3764071" y="795403"/>
+            <a:ext cx="820455" cy="757824"/>
+          </a:xfrm>
+          <a:prstGeom prst="straightConnector1">
+            <a:avLst/>
+          </a:prstGeom>
+          <a:ln>
+            <a:tailEnd type="triangle"/>
+          </a:ln>
+        </p:spPr>
+        <p:style>
+          <a:lnRef idx="1">
+            <a:schemeClr val="accent1"/>
+          </a:lnRef>
+          <a:fillRef idx="0">
+            <a:schemeClr val="accent1"/>
+          </a:fillRef>
+          <a:effectRef idx="0">
+            <a:schemeClr val="accent1"/>
+          </a:effectRef>
+          <a:fontRef idx="minor">
+            <a:schemeClr val="tx1"/>
+          </a:fontRef>
+        </p:style>
+      </p:cxnSp>
+      <p:sp>
+        <p:nvSpPr>
+          <p:cNvPr id="10" name="TextBox 9"/>
+          <p:cNvSpPr txBox="1"/>
+          <p:nvPr/>
+        </p:nvSpPr>
+        <p:spPr>
+          <a:xfrm>
+            <a:off x="4647157" y="526093"/>
+            <a:ext cx="3852337" cy="369332"/>
+          </a:xfrm>
+          <a:prstGeom prst="rect">
+            <a:avLst/>
+          </a:prstGeom>
+          <a:noFill/>
+        </p:spPr>
+        <p:txBody>
+          <a:bodyPr wrap="none" rtlCol="0">
+            <a:spAutoFit/>
+          </a:bodyPr>
+          <a:lstStyle/>
+          <a:p>
+            <a:r>
+              <a:rPr lang="en-US" dirty="0">
+                <a:latin typeface="Arial" panose="020B0604020202020204" pitchFamily="34" charset="0"/>
+                <a:cs typeface="Arial" panose="020B0604020202020204" pitchFamily="34" charset="0"/>
+              </a:rPr>
+              <a:t>This line throws if not a valid integer</a:t>
+            </a:r>
+          </a:p>
+        </p:txBody>
+      </p:sp>
+      <p:sp>
+        <p:nvSpPr>
+          <p:cNvPr id="11" name="TextBox 10"/>
+          <p:cNvSpPr txBox="1"/>
+          <p:nvPr/>
+        </p:nvSpPr>
+        <p:spPr>
+          <a:xfrm>
+            <a:off x="507305" y="56368"/>
+            <a:ext cx="6224781" cy="369332"/>
+          </a:xfrm>
+          <a:prstGeom prst="rect">
+            <a:avLst/>
+          </a:prstGeom>
+          <a:noFill/>
+        </p:spPr>
+        <p:txBody>
+          <a:bodyPr wrap="none" rtlCol="0">
+            <a:spAutoFit/>
+          </a:bodyPr>
+          <a:lstStyle/>
+          <a:p>
+            <a:r>
+              <a:rPr lang="en-US" dirty="0">
+                <a:latin typeface="Arial" panose="020B0604020202020204" pitchFamily="34" charset="0"/>
+                <a:cs typeface="Arial" panose="020B0604020202020204" pitchFamily="34" charset="0"/>
+              </a:rPr>
+              <a:t>GUI applications need to give information back to the users</a:t>
+            </a:r>
+          </a:p>
+        </p:txBody>
+      </p:sp>
+    </p:spTree>
+    <p:extLst>
+      <p:ext uri="{BB962C8B-B14F-4D97-AF65-F5344CB8AC3E}">
+        <p14:creationId xmlns:p14="http://schemas.microsoft.com/office/powerpoint/2010/main" val="2129589058"/>
+      </p:ext>
+    </p:extLst>
+  </p:cSld>
+  <p:clrMapOvr>
+    <a:masterClrMapping/>
+  </p:clrMapOvr>
+</p:sld>
+</file>
+
+<file path=ppt/slides/slide4.xml><?xml version="1.0" encoding="utf-8"?>
+<p:sld xmlns:a="http://schemas.openxmlformats.org/drawingml/2006/main" xmlns:r="http://schemas.openxmlformats.org/officeDocument/2006/relationships" xmlns:p="http://schemas.openxmlformats.org/presentationml/2006/main">
+  <p:cSld>
+    <p:spTree>
+      <p:nvGrpSpPr>
+        <p:cNvPr id="1" name=""/>
+        <p:cNvGrpSpPr/>
+        <p:nvPr/>
+      </p:nvGrpSpPr>
+      <p:grpSpPr>
+        <a:xfrm>
+          <a:off x="0" y="0"/>
+          <a:ext cx="0" cy="0"/>
+          <a:chOff x="0" y="0"/>
+          <a:chExt cx="0" cy="0"/>
+        </a:xfrm>
+      </p:grpSpPr>
+      <p:pic>
+        <p:nvPicPr>
+          <p:cNvPr id="4" name="Picture 3"/>
+          <p:cNvPicPr>
+            <a:picLocks noChangeAspect="1"/>
+          </p:cNvPicPr>
+          <p:nvPr/>
+        </p:nvPicPr>
+        <p:blipFill>
+          <a:blip r:embed="rId2"/>
+          <a:stretch>
+            <a:fillRect/>
+          </a:stretch>
+        </p:blipFill>
+        <p:spPr>
+          <a:xfrm>
             <a:off x="588722" y="966854"/>
             <a:ext cx="11183655" cy="5109880"/>
           </a:xfrm>
@@ -3488,7 +4617,7 @@
 </p:sld>
 </file>
 
-<file path=ppt/slides/slide4.xml><?xml version="1.0" encoding="utf-8"?>
+<file path=ppt/slides/slide5.xml><?xml version="1.0" encoding="utf-8"?>
 <p:sld xmlns:a="http://schemas.openxmlformats.org/drawingml/2006/main" xmlns:r="http://schemas.openxmlformats.org/officeDocument/2006/relationships" xmlns:p="http://schemas.openxmlformats.org/presentationml/2006/main">
   <p:cSld>
     <p:spTree>
@@ -3679,7 +4808,7 @@
 </p:sld>
 </file>
 
-<file path=ppt/slides/slide5.xml><?xml version="1.0" encoding="utf-8"?>
+<file path=ppt/slides/slide6.xml><?xml version="1.0" encoding="utf-8"?>
 <p:sld xmlns:a="http://schemas.openxmlformats.org/drawingml/2006/main" xmlns:r="http://schemas.openxmlformats.org/officeDocument/2006/relationships" xmlns:p="http://schemas.openxmlformats.org/presentationml/2006/main">
   <p:cSld>
     <p:spTree>
@@ -3985,182 +5114,6 @@
 </p:sld>
 </file>
 
-<file path=ppt/slides/slide6.xml><?xml version="1.0" encoding="utf-8"?>
-<p:sld xmlns:a="http://schemas.openxmlformats.org/drawingml/2006/main" xmlns:r="http://schemas.openxmlformats.org/officeDocument/2006/relationships" xmlns:p="http://schemas.openxmlformats.org/presentationml/2006/main">
-  <p:cSld>
-    <p:spTree>
-      <p:nvGrpSpPr>
-        <p:cNvPr id="1" name=""/>
-        <p:cNvGrpSpPr/>
-        <p:nvPr/>
-      </p:nvGrpSpPr>
-      <p:grpSpPr>
-        <a:xfrm>
-          <a:off x="0" y="0"/>
-          <a:ext cx="0" cy="0"/>
-          <a:chOff x="0" y="0"/>
-          <a:chExt cx="0" cy="0"/>
-        </a:xfrm>
-      </p:grpSpPr>
-      <p:sp>
-        <p:nvSpPr>
-          <p:cNvPr id="2" name="TextBox 1"/>
-          <p:cNvSpPr txBox="1"/>
-          <p:nvPr/>
-        </p:nvSpPr>
-        <p:spPr>
-          <a:xfrm>
-            <a:off x="475014" y="130630"/>
-            <a:ext cx="7019870" cy="369332"/>
-          </a:xfrm>
-          <a:prstGeom prst="rect">
-            <a:avLst/>
-          </a:prstGeom>
-          <a:noFill/>
-        </p:spPr>
-        <p:txBody>
-          <a:bodyPr wrap="none" rtlCol="0">
-            <a:spAutoFit/>
-          </a:bodyPr>
-          <a:lstStyle/>
-          <a:p>
-            <a:r>
-              <a:rPr lang="en-US" dirty="0">
-                <a:latin typeface="Arial" panose="020B0604020202020204" pitchFamily="34" charset="0"/>
-                <a:cs typeface="Arial" panose="020B0604020202020204" pitchFamily="34" charset="0"/>
-              </a:rPr>
-              <a:t>I made a version that (I think) may address some of these issues…</a:t>
-            </a:r>
-          </a:p>
-        </p:txBody>
-      </p:sp>
-      <p:sp>
-        <p:nvSpPr>
-          <p:cNvPr id="3" name="Rectangle 2"/>
-          <p:cNvSpPr/>
-          <p:nvPr/>
-        </p:nvSpPr>
-        <p:spPr>
-          <a:xfrm>
-            <a:off x="475014" y="6300298"/>
-            <a:ext cx="11297392" cy="369332"/>
-          </a:xfrm>
-          <a:prstGeom prst="rect">
-            <a:avLst/>
-          </a:prstGeom>
-        </p:spPr>
-        <p:txBody>
-          <a:bodyPr wrap="square">
-            <a:spAutoFit/>
-          </a:bodyPr>
-          <a:lstStyle/>
-          <a:p>
-            <a:r>
-              <a:rPr lang="en-US" dirty="0"/>
-              <a:t>https://github.com/afodor/metagenomicsTools/blob/master/src/classExamples/gui/PrimeNumGen.java</a:t>
-            </a:r>
-          </a:p>
-        </p:txBody>
-      </p:sp>
-      <p:pic>
-        <p:nvPicPr>
-          <p:cNvPr id="4" name="Picture 3"/>
-          <p:cNvPicPr>
-            <a:picLocks noChangeAspect="1"/>
-          </p:cNvPicPr>
-          <p:nvPr/>
-        </p:nvPicPr>
-        <p:blipFill>
-          <a:blip r:embed="rId2"/>
-          <a:stretch>
-            <a:fillRect/>
-          </a:stretch>
-        </p:blipFill>
-        <p:spPr>
-          <a:xfrm>
-            <a:off x="619744" y="881494"/>
-            <a:ext cx="7134843" cy="4193763"/>
-          </a:xfrm>
-          <a:prstGeom prst="rect">
-            <a:avLst/>
-          </a:prstGeom>
-        </p:spPr>
-      </p:pic>
-      <p:cxnSp>
-        <p:nvCxnSpPr>
-          <p:cNvPr id="8" name="Straight Arrow Connector 7"/>
-          <p:cNvCxnSpPr/>
-          <p:nvPr/>
-        </p:nvCxnSpPr>
-        <p:spPr>
-          <a:xfrm flipH="1" flipV="1">
-            <a:off x="5118265" y="2802577"/>
-            <a:ext cx="807522" cy="178129"/>
-          </a:xfrm>
-          <a:prstGeom prst="straightConnector1">
-            <a:avLst/>
-          </a:prstGeom>
-          <a:ln>
-            <a:tailEnd type="triangle"/>
-          </a:ln>
-        </p:spPr>
-        <p:style>
-          <a:lnRef idx="1">
-            <a:schemeClr val="accent1"/>
-          </a:lnRef>
-          <a:fillRef idx="0">
-            <a:schemeClr val="accent1"/>
-          </a:fillRef>
-          <a:effectRef idx="0">
-            <a:schemeClr val="accent1"/>
-          </a:effectRef>
-          <a:fontRef idx="minor">
-            <a:schemeClr val="tx1"/>
-          </a:fontRef>
-        </p:style>
-      </p:cxnSp>
-      <p:sp>
-        <p:nvSpPr>
-          <p:cNvPr id="9" name="TextBox 8"/>
-          <p:cNvSpPr txBox="1"/>
-          <p:nvPr/>
-        </p:nvSpPr>
-        <p:spPr>
-          <a:xfrm>
-            <a:off x="6068291" y="2838203"/>
-            <a:ext cx="1881734" cy="369332"/>
-          </a:xfrm>
-          <a:prstGeom prst="rect">
-            <a:avLst/>
-          </a:prstGeom>
-          <a:noFill/>
-        </p:spPr>
-        <p:txBody>
-          <a:bodyPr wrap="none" rtlCol="0">
-            <a:spAutoFit/>
-          </a:bodyPr>
-          <a:lstStyle/>
-          <a:p>
-            <a:r>
-              <a:rPr lang="en-US" dirty="0"/>
-              <a:t>Volatile cancel tag</a:t>
-            </a:r>
-          </a:p>
-        </p:txBody>
-      </p:sp>
-    </p:spTree>
-    <p:extLst>
-      <p:ext uri="{BB962C8B-B14F-4D97-AF65-F5344CB8AC3E}">
-        <p14:creationId xmlns:p14="http://schemas.microsoft.com/office/powerpoint/2010/main" val="2833409814"/>
-      </p:ext>
-    </p:extLst>
-  </p:cSld>
-  <p:clrMapOvr>
-    <a:masterClrMapping/>
-  </p:clrMapOvr>
-</p:sld>
-</file>
-
 <file path=ppt/slides/slide7.xml><?xml version="1.0" encoding="utf-8"?>
 <p:sld xmlns:a="http://schemas.openxmlformats.org/drawingml/2006/main" xmlns:r="http://schemas.openxmlformats.org/officeDocument/2006/relationships" xmlns:p="http://schemas.openxmlformats.org/presentationml/2006/main">
   <p:cSld>
@@ -4178,10 +5131,372 @@
           <a:chExt cx="0" cy="0"/>
         </a:xfrm>
       </p:grpSpPr>
+      <p:sp>
+        <p:nvSpPr>
+          <p:cNvPr id="4" name="TextBox 3"/>
+          <p:cNvSpPr txBox="1"/>
+          <p:nvPr/>
+        </p:nvSpPr>
+        <p:spPr>
+          <a:xfrm>
+            <a:off x="939452" y="-18788"/>
+            <a:ext cx="7250703" cy="369332"/>
+          </a:xfrm>
+          <a:prstGeom prst="rect">
+            <a:avLst/>
+          </a:prstGeom>
+          <a:noFill/>
+        </p:spPr>
+        <p:txBody>
+          <a:bodyPr wrap="none" rtlCol="0">
+            <a:spAutoFit/>
+          </a:bodyPr>
+          <a:lstStyle/>
+          <a:p>
+            <a:r>
+              <a:rPr lang="en-US" dirty="0">
+                <a:latin typeface="Arial" panose="020B0604020202020204" pitchFamily="34" charset="0"/>
+                <a:cs typeface="Arial" panose="020B0604020202020204" pitchFamily="34" charset="0"/>
+              </a:rPr>
+              <a:t>I was able to “freeze” the program (although it didn’t always freeze…)</a:t>
+            </a:r>
+          </a:p>
+        </p:txBody>
+      </p:sp>
+      <p:pic>
+        <p:nvPicPr>
+          <p:cNvPr id="7" name="Picture 6"/>
+          <p:cNvPicPr>
+            <a:picLocks noChangeAspect="1"/>
+          </p:cNvPicPr>
+          <p:nvPr/>
+        </p:nvPicPr>
+        <p:blipFill>
+          <a:blip r:embed="rId2"/>
+          <a:stretch>
+            <a:fillRect/>
+          </a:stretch>
+        </p:blipFill>
+        <p:spPr>
+          <a:xfrm>
+            <a:off x="1213677" y="582459"/>
+            <a:ext cx="8218422" cy="5772041"/>
+          </a:xfrm>
+          <a:prstGeom prst="rect">
+            <a:avLst/>
+          </a:prstGeom>
+        </p:spPr>
+      </p:pic>
     </p:spTree>
     <p:extLst>
       <p:ext uri="{BB962C8B-B14F-4D97-AF65-F5344CB8AC3E}">
-        <p14:creationId xmlns:p14="http://schemas.microsoft.com/office/powerpoint/2010/main" val="3936695301"/>
+        <p14:creationId xmlns:p14="http://schemas.microsoft.com/office/powerpoint/2010/main" val="1450690429"/>
+      </p:ext>
+    </p:extLst>
+  </p:cSld>
+  <p:clrMapOvr>
+    <a:masterClrMapping/>
+  </p:clrMapOvr>
+</p:sld>
+</file>
+
+<file path=ppt/slides/slide8.xml><?xml version="1.0" encoding="utf-8"?>
+<p:sld xmlns:a="http://schemas.openxmlformats.org/drawingml/2006/main" xmlns:r="http://schemas.openxmlformats.org/officeDocument/2006/relationships" xmlns:p="http://schemas.openxmlformats.org/presentationml/2006/main">
+  <p:cSld>
+    <p:spTree>
+      <p:nvGrpSpPr>
+        <p:cNvPr id="1" name=""/>
+        <p:cNvGrpSpPr/>
+        <p:nvPr/>
+      </p:nvGrpSpPr>
+      <p:grpSpPr>
+        <a:xfrm>
+          <a:off x="0" y="0"/>
+          <a:ext cx="0" cy="0"/>
+          <a:chOff x="0" y="0"/>
+          <a:chExt cx="0" cy="0"/>
+        </a:xfrm>
+      </p:grpSpPr>
+      <p:pic>
+        <p:nvPicPr>
+          <p:cNvPr id="5" name="Picture 4"/>
+          <p:cNvPicPr>
+            <a:picLocks noChangeAspect="1"/>
+          </p:cNvPicPr>
+          <p:nvPr/>
+        </p:nvPicPr>
+        <p:blipFill>
+          <a:blip r:embed="rId2"/>
+          <a:stretch>
+            <a:fillRect/>
+          </a:stretch>
+        </p:blipFill>
+        <p:spPr>
+          <a:xfrm>
+            <a:off x="0" y="523427"/>
+            <a:ext cx="12192000" cy="3143108"/>
+          </a:xfrm>
+          <a:prstGeom prst="rect">
+            <a:avLst/>
+          </a:prstGeom>
+        </p:spPr>
+      </p:pic>
+      <p:sp>
+        <p:nvSpPr>
+          <p:cNvPr id="2" name="TextBox 1"/>
+          <p:cNvSpPr txBox="1"/>
+          <p:nvPr/>
+        </p:nvSpPr>
+        <p:spPr>
+          <a:xfrm>
+            <a:off x="475014" y="130630"/>
+            <a:ext cx="7019870" cy="369332"/>
+          </a:xfrm>
+          <a:prstGeom prst="rect">
+            <a:avLst/>
+          </a:prstGeom>
+          <a:noFill/>
+        </p:spPr>
+        <p:txBody>
+          <a:bodyPr wrap="none" rtlCol="0">
+            <a:spAutoFit/>
+          </a:bodyPr>
+          <a:lstStyle/>
+          <a:p>
+            <a:r>
+              <a:rPr lang="en-US" dirty="0">
+                <a:latin typeface="Arial" panose="020B0604020202020204" pitchFamily="34" charset="0"/>
+                <a:cs typeface="Arial" panose="020B0604020202020204" pitchFamily="34" charset="0"/>
+              </a:rPr>
+              <a:t>I made a version that (I think) may address some of these issues…</a:t>
+            </a:r>
+          </a:p>
+        </p:txBody>
+      </p:sp>
+      <p:sp>
+        <p:nvSpPr>
+          <p:cNvPr id="3" name="Rectangle 2"/>
+          <p:cNvSpPr/>
+          <p:nvPr/>
+        </p:nvSpPr>
+        <p:spPr>
+          <a:xfrm>
+            <a:off x="475014" y="6300298"/>
+            <a:ext cx="11297392" cy="369332"/>
+          </a:xfrm>
+          <a:prstGeom prst="rect">
+            <a:avLst/>
+          </a:prstGeom>
+        </p:spPr>
+        <p:txBody>
+          <a:bodyPr wrap="square">
+            <a:spAutoFit/>
+          </a:bodyPr>
+          <a:lstStyle/>
+          <a:p>
+            <a:r>
+              <a:rPr lang="en-US" dirty="0"/>
+              <a:t>https://github.com/afodor/metagenomicsTools/blob/master/src/classExamples/gui/PrimeNumGen.java</a:t>
+            </a:r>
+          </a:p>
+        </p:txBody>
+      </p:sp>
+      <p:cxnSp>
+        <p:nvCxnSpPr>
+          <p:cNvPr id="8" name="Straight Arrow Connector 7"/>
+          <p:cNvCxnSpPr>
+            <a:cxnSpLocks/>
+          </p:cNvCxnSpPr>
+          <p:nvPr/>
+        </p:nvCxnSpPr>
+        <p:spPr>
+          <a:xfrm flipH="1" flipV="1">
+            <a:off x="7848933" y="3115728"/>
+            <a:ext cx="768973" cy="310141"/>
+          </a:xfrm>
+          <a:prstGeom prst="straightConnector1">
+            <a:avLst/>
+          </a:prstGeom>
+          <a:ln>
+            <a:tailEnd type="triangle"/>
+          </a:ln>
+        </p:spPr>
+        <p:style>
+          <a:lnRef idx="1">
+            <a:schemeClr val="accent1"/>
+          </a:lnRef>
+          <a:fillRef idx="0">
+            <a:schemeClr val="accent1"/>
+          </a:fillRef>
+          <a:effectRef idx="0">
+            <a:schemeClr val="accent1"/>
+          </a:effectRef>
+          <a:fontRef idx="minor">
+            <a:schemeClr val="tx1"/>
+          </a:fontRef>
+        </p:style>
+      </p:cxnSp>
+      <p:sp>
+        <p:nvSpPr>
+          <p:cNvPr id="9" name="TextBox 8"/>
+          <p:cNvSpPr txBox="1"/>
+          <p:nvPr/>
+        </p:nvSpPr>
+        <p:spPr>
+          <a:xfrm>
+            <a:off x="8573491" y="3170142"/>
+            <a:ext cx="1931041" cy="369332"/>
+          </a:xfrm>
+          <a:prstGeom prst="rect">
+            <a:avLst/>
+          </a:prstGeom>
+          <a:noFill/>
+        </p:spPr>
+        <p:txBody>
+          <a:bodyPr wrap="none" rtlCol="0">
+            <a:spAutoFit/>
+          </a:bodyPr>
+          <a:lstStyle/>
+          <a:p>
+            <a:r>
+              <a:rPr lang="en-US" dirty="0"/>
+              <a:t>Volatile cancel flag</a:t>
+            </a:r>
+          </a:p>
+        </p:txBody>
+      </p:sp>
+    </p:spTree>
+    <p:extLst>
+      <p:ext uri="{BB962C8B-B14F-4D97-AF65-F5344CB8AC3E}">
+        <p14:creationId xmlns:p14="http://schemas.microsoft.com/office/powerpoint/2010/main" val="2833409814"/>
+      </p:ext>
+    </p:extLst>
+  </p:cSld>
+  <p:clrMapOvr>
+    <a:masterClrMapping/>
+  </p:clrMapOvr>
+</p:sld>
+</file>
+
+<file path=ppt/slides/slide9.xml><?xml version="1.0" encoding="utf-8"?>
+<p:sld xmlns:a="http://schemas.openxmlformats.org/drawingml/2006/main" xmlns:r="http://schemas.openxmlformats.org/officeDocument/2006/relationships" xmlns:p="http://schemas.openxmlformats.org/presentationml/2006/main">
+  <p:cSld>
+    <p:spTree>
+      <p:nvGrpSpPr>
+        <p:cNvPr id="1" name=""/>
+        <p:cNvGrpSpPr/>
+        <p:nvPr/>
+      </p:nvGrpSpPr>
+      <p:grpSpPr>
+        <a:xfrm>
+          <a:off x="0" y="0"/>
+          <a:ext cx="0" cy="0"/>
+          <a:chOff x="0" y="0"/>
+          <a:chExt cx="0" cy="0"/>
+        </a:xfrm>
+      </p:grpSpPr>
+      <p:pic>
+        <p:nvPicPr>
+          <p:cNvPr id="8" name="Picture 7"/>
+          <p:cNvPicPr>
+            <a:picLocks noChangeAspect="1"/>
+          </p:cNvPicPr>
+          <p:nvPr/>
+        </p:nvPicPr>
+        <p:blipFill>
+          <a:blip r:embed="rId2"/>
+          <a:stretch>
+            <a:fillRect/>
+          </a:stretch>
+        </p:blipFill>
+        <p:spPr>
+          <a:xfrm>
+            <a:off x="0" y="76313"/>
+            <a:ext cx="12192000" cy="6542533"/>
+          </a:xfrm>
+          <a:prstGeom prst="rect">
+            <a:avLst/>
+          </a:prstGeom>
+        </p:spPr>
+      </p:pic>
+      <p:sp>
+        <p:nvSpPr>
+          <p:cNvPr id="7" name="TextBox 6"/>
+          <p:cNvSpPr txBox="1"/>
+          <p:nvPr/>
+        </p:nvSpPr>
+        <p:spPr>
+          <a:xfrm>
+            <a:off x="4835048" y="2048005"/>
+            <a:ext cx="6224781" cy="646331"/>
+          </a:xfrm>
+          <a:prstGeom prst="rect">
+            <a:avLst/>
+          </a:prstGeom>
+          <a:noFill/>
+        </p:spPr>
+        <p:txBody>
+          <a:bodyPr wrap="none" rtlCol="0">
+            <a:spAutoFit/>
+          </a:bodyPr>
+          <a:lstStyle/>
+          <a:p>
+            <a:r>
+              <a:rPr lang="en-US" dirty="0">
+                <a:latin typeface="Arial" panose="020B0604020202020204" pitchFamily="34" charset="0"/>
+                <a:cs typeface="Arial" panose="020B0604020202020204" pitchFamily="34" charset="0"/>
+              </a:rPr>
+              <a:t>Private constructor</a:t>
+            </a:r>
+          </a:p>
+          <a:p>
+            <a:r>
+              <a:rPr lang="en-US" dirty="0">
+                <a:latin typeface="Arial" panose="020B0604020202020204" pitchFamily="34" charset="0"/>
+                <a:cs typeface="Arial" panose="020B0604020202020204" pitchFamily="34" charset="0"/>
+              </a:rPr>
+              <a:t>(because we will add the action listeners after construction)</a:t>
+            </a:r>
+          </a:p>
+        </p:txBody>
+      </p:sp>
+      <p:cxnSp>
+        <p:nvCxnSpPr>
+          <p:cNvPr id="10" name="Straight Arrow Connector 9"/>
+          <p:cNvCxnSpPr/>
+          <p:nvPr/>
+        </p:nvCxnSpPr>
+        <p:spPr>
+          <a:xfrm flipH="1">
+            <a:off x="958241" y="2198318"/>
+            <a:ext cx="3751545" cy="569934"/>
+          </a:xfrm>
+          <a:prstGeom prst="straightConnector1">
+            <a:avLst/>
+          </a:prstGeom>
+          <a:ln>
+            <a:tailEnd type="triangle"/>
+          </a:ln>
+        </p:spPr>
+        <p:style>
+          <a:lnRef idx="1">
+            <a:schemeClr val="accent1"/>
+          </a:lnRef>
+          <a:fillRef idx="0">
+            <a:schemeClr val="accent1"/>
+          </a:fillRef>
+          <a:effectRef idx="0">
+            <a:schemeClr val="accent1"/>
+          </a:effectRef>
+          <a:fontRef idx="minor">
+            <a:schemeClr val="tx1"/>
+          </a:fontRef>
+        </p:style>
+      </p:cxnSp>
+    </p:spTree>
+    <p:extLst>
+      <p:ext uri="{BB962C8B-B14F-4D97-AF65-F5344CB8AC3E}">
+        <p14:creationId xmlns:p14="http://schemas.microsoft.com/office/powerpoint/2010/main" val="528898053"/>
       </p:ext>
     </p:extLst>
   </p:cSld>

</xml_diff>